<commit_message>
Atualizacao do material do treinamento
</commit_message>
<xml_diff>
--- a/presentations/01 - Introducao ao treinamento.pptx
+++ b/presentations/01 - Introducao ao treinamento.pptx
@@ -5,19 +5,21 @@
     <p:sldMasterId id="2147483668" r:id="rId4"/>
   </p:sldMasterIdLst>
   <p:notesMasterIdLst>
-    <p:notesMasterId r:id="rId12"/>
+    <p:notesMasterId r:id="rId14"/>
   </p:notesMasterIdLst>
   <p:handoutMasterIdLst>
-    <p:handoutMasterId r:id="rId13"/>
+    <p:handoutMasterId r:id="rId15"/>
   </p:handoutMasterIdLst>
   <p:sldIdLst>
     <p:sldId id="285" r:id="rId5"/>
-    <p:sldId id="268" r:id="rId6"/>
-    <p:sldId id="324" r:id="rId7"/>
-    <p:sldId id="300" r:id="rId8"/>
-    <p:sldId id="291" r:id="rId9"/>
-    <p:sldId id="325" r:id="rId10"/>
-    <p:sldId id="283" r:id="rId11"/>
+    <p:sldId id="327" r:id="rId6"/>
+    <p:sldId id="326" r:id="rId7"/>
+    <p:sldId id="268" r:id="rId8"/>
+    <p:sldId id="324" r:id="rId9"/>
+    <p:sldId id="300" r:id="rId10"/>
+    <p:sldId id="291" r:id="rId11"/>
+    <p:sldId id="325" r:id="rId12"/>
+    <p:sldId id="283" r:id="rId13"/>
   </p:sldIdLst>
   <p:sldSz cx="12192000" cy="6858000"/>
   <p:notesSz cx="6858000" cy="9144000"/>
@@ -227,7 +229,7 @@
             <a:fld id="{9DEF996C-CA2C-436E-A903-7F2E7C68ADF8}" type="datetimeFigureOut">
               <a:rPr lang="en-US" smtClean="0"/>
               <a:pPr/>
-              <a:t>7/7/2020</a:t>
+              <a:t>7/13/2020</a:t>
             </a:fld>
             <a:endParaRPr lang="en-US"/>
           </a:p>
@@ -394,7 +396,7 @@
             <a:fld id="{56D6514A-F4CA-40F5-B508-6CC5FEA6DD64}" type="datetimeFigureOut">
               <a:rPr lang="en-US" smtClean="0"/>
               <a:pPr/>
-              <a:t>7/7/2020</a:t>
+              <a:t>7/13/2020</a:t>
             </a:fld>
             <a:endParaRPr lang="en-US"/>
           </a:p>
@@ -854,7 +856,7 @@
           <a:p>
             <a:fld id="{0A0255A0-EE2B-6E49-A611-C16850102233}" type="datetimeFigureOut">
               <a:rPr lang="en-US" smtClean="0"/>
-              <a:t>7/7/2020</a:t>
+              <a:t>7/13/2020</a:t>
             </a:fld>
             <a:endParaRPr lang="en-US"/>
           </a:p>
@@ -1048,7 +1050,7 @@
           <a:p>
             <a:fld id="{0A0255A0-EE2B-6E49-A611-C16850102233}" type="datetimeFigureOut">
               <a:rPr lang="en-US" smtClean="0"/>
-              <a:t>7/7/2020</a:t>
+              <a:t>7/13/2020</a:t>
             </a:fld>
             <a:endParaRPr lang="en-US"/>
           </a:p>
@@ -1252,7 +1254,7 @@
           <a:p>
             <a:fld id="{0A0255A0-EE2B-6E49-A611-C16850102233}" type="datetimeFigureOut">
               <a:rPr lang="en-US" smtClean="0"/>
-              <a:t>7/7/2020</a:t>
+              <a:t>7/13/2020</a:t>
             </a:fld>
             <a:endParaRPr lang="en-US"/>
           </a:p>
@@ -2769,7 +2771,7 @@
           <a:p>
             <a:fld id="{0A0255A0-EE2B-6E49-A611-C16850102233}" type="datetimeFigureOut">
               <a:rPr lang="en-US" smtClean="0"/>
-              <a:t>7/7/2020</a:t>
+              <a:t>7/13/2020</a:t>
             </a:fld>
             <a:endParaRPr lang="en-US"/>
           </a:p>
@@ -3039,7 +3041,7 @@
           <a:p>
             <a:fld id="{0A0255A0-EE2B-6E49-A611-C16850102233}" type="datetimeFigureOut">
               <a:rPr lang="en-US" smtClean="0"/>
-              <a:t>7/7/2020</a:t>
+              <a:t>7/13/2020</a:t>
             </a:fld>
             <a:endParaRPr lang="en-US"/>
           </a:p>
@@ -3351,7 +3353,7 @@
           <a:p>
             <a:fld id="{0A0255A0-EE2B-6E49-A611-C16850102233}" type="datetimeFigureOut">
               <a:rPr lang="en-US" smtClean="0"/>
-              <a:t>7/7/2020</a:t>
+              <a:t>7/13/2020</a:t>
             </a:fld>
             <a:endParaRPr lang="en-US"/>
           </a:p>
@@ -3797,7 +3799,7 @@
           <a:p>
             <a:fld id="{0A0255A0-EE2B-6E49-A611-C16850102233}" type="datetimeFigureOut">
               <a:rPr lang="en-US" smtClean="0"/>
-              <a:t>7/7/2020</a:t>
+              <a:t>7/13/2020</a:t>
             </a:fld>
             <a:endParaRPr lang="en-US"/>
           </a:p>
@@ -3939,7 +3941,7 @@
           <a:p>
             <a:fld id="{0A0255A0-EE2B-6E49-A611-C16850102233}" type="datetimeFigureOut">
               <a:rPr lang="en-US" smtClean="0"/>
-              <a:t>7/7/2020</a:t>
+              <a:t>7/13/2020</a:t>
             </a:fld>
             <a:endParaRPr lang="en-US"/>
           </a:p>
@@ -4058,7 +4060,7 @@
           <a:p>
             <a:fld id="{0A0255A0-EE2B-6E49-A611-C16850102233}" type="datetimeFigureOut">
               <a:rPr lang="en-US" smtClean="0"/>
-              <a:t>7/7/2020</a:t>
+              <a:t>7/13/2020</a:t>
             </a:fld>
             <a:endParaRPr lang="en-US"/>
           </a:p>
@@ -4359,7 +4361,7 @@
           <a:p>
             <a:fld id="{0A0255A0-EE2B-6E49-A611-C16850102233}" type="datetimeFigureOut">
               <a:rPr lang="en-US" smtClean="0"/>
-              <a:t>7/7/2020</a:t>
+              <a:t>7/13/2020</a:t>
             </a:fld>
             <a:endParaRPr lang="en-US"/>
           </a:p>
@@ -4636,7 +4638,7 @@
           <a:p>
             <a:fld id="{0A0255A0-EE2B-6E49-A611-C16850102233}" type="datetimeFigureOut">
               <a:rPr lang="en-US" smtClean="0"/>
-              <a:t>7/7/2020</a:t>
+              <a:t>7/13/2020</a:t>
             </a:fld>
             <a:endParaRPr lang="en-US"/>
           </a:p>
@@ -5976,7 +5978,7 @@
 </file>
 
 <file path=ppt/slides/slide2.xml><?xml version="1.0" encoding="utf-8"?>
-<p:sld xmlns:a="http://schemas.openxmlformats.org/drawingml/2006/main" xmlns:r="http://schemas.openxmlformats.org/officeDocument/2006/relationships" xmlns:p="http://schemas.openxmlformats.org/presentationml/2006/main">
+<p:sld xmlns:a="http://schemas.openxmlformats.org/drawingml/2006/main" xmlns:r="http://schemas.openxmlformats.org/officeDocument/2006/relationships" xmlns:p="http://schemas.openxmlformats.org/presentationml/2006/main" show="0">
   <p:cSld>
     <p:spTree>
       <p:nvGrpSpPr>
@@ -5994,57 +5996,588 @@
       </p:grpSpPr>
       <p:sp>
         <p:nvSpPr>
-          <p:cNvPr id="6" name="Rectangle 13"/>
+          <p:cNvPr id="2" name="Título 1"/>
+          <p:cNvSpPr>
+            <a:spLocks noGrp="1"/>
+          </p:cNvSpPr>
+          <p:nvPr>
+            <p:ph type="title"/>
+          </p:nvPr>
+        </p:nvSpPr>
+        <p:spPr/>
+        <p:txBody>
+          <a:bodyPr/>
+          <a:lstStyle/>
+          <a:p>
+            <a:r>
+              <a:rPr lang="pt-BR" dirty="0">
+                <a:latin typeface="Segoe UI" panose="020B0502040204020203" pitchFamily="34" charset="0"/>
+                <a:cs typeface="Segoe UI" panose="020B0502040204020203" pitchFamily="34" charset="0"/>
+              </a:rPr>
+              <a:t>Breve apresentação</a:t>
+            </a:r>
+          </a:p>
+        </p:txBody>
+      </p:sp>
+      <p:sp>
+        <p:nvSpPr>
+          <p:cNvPr id="8" name="Rectangle 12">
+            <a:extLst>
+              <a:ext uri="{FF2B5EF4-FFF2-40B4-BE49-F238E27FC236}">
+                <a16:creationId xmlns:a16="http://schemas.microsoft.com/office/drawing/2014/main" id="{3D787F54-2FF9-467A-B9AF-F0E3D03C9E05}"/>
+              </a:ext>
+            </a:extLst>
+          </p:cNvPr>
           <p:cNvSpPr/>
           <p:nvPr/>
         </p:nvSpPr>
         <p:spPr>
           <a:xfrm>
-            <a:off x="335360" y="3076901"/>
-            <a:ext cx="4680520" cy="639855"/>
-          </a:xfrm>
-          <a:prstGeom prst="rect">
-            <a:avLst/>
-          </a:prstGeom>
-        </p:spPr>
-        <p:txBody>
-          <a:bodyPr wrap="square" anchor="ctr">
+            <a:off x="2749974" y="2932447"/>
+            <a:ext cx="1788888" cy="369332"/>
+          </a:xfrm>
+          <a:prstGeom prst="rect">
+            <a:avLst/>
+          </a:prstGeom>
+        </p:spPr>
+        <p:txBody>
+          <a:bodyPr wrap="none">
             <a:spAutoFit/>
           </a:bodyPr>
           <a:lstStyle/>
           <a:p>
-            <a:pPr lvl="0">
-              <a:lnSpc>
-                <a:spcPts val="4600"/>
-              </a:lnSpc>
-            </a:pPr>
-            <a:r>
-              <a:rPr lang="en-US" sz="3600" dirty="0" err="1">
+            <a:r>
+              <a:rPr lang="pt-BR" dirty="0">
                 <a:solidFill>
-                  <a:srgbClr val="FFFFFF"/>
+                  <a:srgbClr val="123274"/>
                 </a:solidFill>
                 <a:latin typeface="Segoe UI" panose="020B0502040204020203" pitchFamily="34" charset="0"/>
                 <a:cs typeface="Segoe UI" panose="020B0502040204020203" pitchFamily="34" charset="0"/>
               </a:rPr>
-              <a:t>Introdução</a:t>
-            </a:r>
-            <a:endParaRPr lang="en-US" sz="3600" dirty="0">
+              <a:t>Lucas Tavernaro</a:t>
+            </a:r>
+          </a:p>
+        </p:txBody>
+      </p:sp>
+      <p:sp>
+        <p:nvSpPr>
+          <p:cNvPr id="9" name="Rectangle 16">
+            <a:extLst>
+              <a:ext uri="{FF2B5EF4-FFF2-40B4-BE49-F238E27FC236}">
+                <a16:creationId xmlns:a16="http://schemas.microsoft.com/office/drawing/2014/main" id="{7FC4B791-201E-4556-8285-DCC8E99EF699}"/>
+              </a:ext>
+            </a:extLst>
+          </p:cNvPr>
+          <p:cNvSpPr/>
+          <p:nvPr/>
+        </p:nvSpPr>
+        <p:spPr>
+          <a:xfrm>
+            <a:off x="8021022" y="2096375"/>
+            <a:ext cx="1393523" cy="369332"/>
+          </a:xfrm>
+          <a:prstGeom prst="rect">
+            <a:avLst/>
+          </a:prstGeom>
+        </p:spPr>
+        <p:txBody>
+          <a:bodyPr wrap="none">
+            <a:spAutoFit/>
+          </a:bodyPr>
+          <a:lstStyle/>
+          <a:p>
+            <a:r>
+              <a:rPr lang="pt-BR" dirty="0">
+                <a:solidFill>
+                  <a:srgbClr val="123274"/>
+                </a:solidFill>
+                <a:latin typeface="Segoe UI" panose="020B0502040204020203" pitchFamily="34" charset="0"/>
+                <a:cs typeface="Segoe UI" panose="020B0502040204020203" pitchFamily="34" charset="0"/>
+              </a:rPr>
+              <a:t>Agile Coach</a:t>
+            </a:r>
+          </a:p>
+        </p:txBody>
+      </p:sp>
+      <p:pic>
+        <p:nvPicPr>
+          <p:cNvPr id="11" name="Picture 18" descr="A close up of a logo&#10;&#10;Description automatically generated">
+            <a:extLst>
+              <a:ext uri="{FF2B5EF4-FFF2-40B4-BE49-F238E27FC236}">
+                <a16:creationId xmlns:a16="http://schemas.microsoft.com/office/drawing/2014/main" id="{F5D9E358-98FE-4F04-8C12-307454710702}"/>
+              </a:ext>
+            </a:extLst>
+          </p:cNvPr>
+          <p:cNvPicPr>
+            <a:picLocks noChangeAspect="1"/>
+          </p:cNvPicPr>
+          <p:nvPr/>
+        </p:nvPicPr>
+        <p:blipFill>
+          <a:blip r:embed="rId2" cstate="print">
+            <a:extLst>
+              <a:ext uri="{28A0092B-C50C-407E-A947-70E740481C1C}">
+                <a14:useLocalDpi xmlns:a14="http://schemas.microsoft.com/office/drawing/2010/main" val="0"/>
+              </a:ext>
+            </a:extLst>
+          </a:blip>
+          <a:stretch>
+            <a:fillRect/>
+          </a:stretch>
+        </p:blipFill>
+        <p:spPr>
+          <a:xfrm>
+            <a:off x="8365711" y="1243153"/>
+            <a:ext cx="704148" cy="776200"/>
+          </a:xfrm>
+          <a:prstGeom prst="rect">
+            <a:avLst/>
+          </a:prstGeom>
+        </p:spPr>
+      </p:pic>
+      <p:pic>
+        <p:nvPicPr>
+          <p:cNvPr id="12" name="Picture 22" descr="A close up of a logo&#10;&#10;Description automatically generated">
+            <a:extLst>
+              <a:ext uri="{FF2B5EF4-FFF2-40B4-BE49-F238E27FC236}">
+                <a16:creationId xmlns:a16="http://schemas.microsoft.com/office/drawing/2014/main" id="{B87281B2-2B96-47E1-B3F1-91FA58D9B705}"/>
+              </a:ext>
+            </a:extLst>
+          </p:cNvPr>
+          <p:cNvPicPr>
+            <a:picLocks noChangeAspect="1"/>
+          </p:cNvPicPr>
+          <p:nvPr/>
+        </p:nvPicPr>
+        <p:blipFill>
+          <a:blip r:embed="rId3" cstate="print">
+            <a:extLst>
+              <a:ext uri="{28A0092B-C50C-407E-A947-70E740481C1C}">
+                <a14:useLocalDpi xmlns:a14="http://schemas.microsoft.com/office/drawing/2010/main" val="0"/>
+              </a:ext>
+            </a:extLst>
+          </a:blip>
+          <a:stretch>
+            <a:fillRect/>
+          </a:stretch>
+        </p:blipFill>
+        <p:spPr>
+          <a:xfrm>
+            <a:off x="3306777" y="3773093"/>
+            <a:ext cx="689449" cy="692967"/>
+          </a:xfrm>
+          <a:prstGeom prst="rect">
+            <a:avLst/>
+          </a:prstGeom>
+        </p:spPr>
+      </p:pic>
+      <p:sp>
+        <p:nvSpPr>
+          <p:cNvPr id="13" name="Rectangle 23">
+            <a:extLst>
+              <a:ext uri="{FF2B5EF4-FFF2-40B4-BE49-F238E27FC236}">
+                <a16:creationId xmlns:a16="http://schemas.microsoft.com/office/drawing/2014/main" id="{45C55203-B064-4C1B-B2D6-C231252269BF}"/>
+              </a:ext>
+            </a:extLst>
+          </p:cNvPr>
+          <p:cNvSpPr/>
+          <p:nvPr/>
+        </p:nvSpPr>
+        <p:spPr>
+          <a:xfrm>
+            <a:off x="915197" y="4558405"/>
+            <a:ext cx="5472607" cy="1477328"/>
+          </a:xfrm>
+          <a:prstGeom prst="rect">
+            <a:avLst/>
+          </a:prstGeom>
+        </p:spPr>
+        <p:txBody>
+          <a:bodyPr wrap="square">
+            <a:spAutoFit/>
+          </a:bodyPr>
+          <a:lstStyle/>
+          <a:p>
+            <a:pPr marL="171450" indent="-171450">
+              <a:buFontTx/>
+              <a:buChar char="-"/>
+            </a:pPr>
+            <a:r>
+              <a:rPr lang="pt-BR" sz="1600" dirty="0">
+                <a:solidFill>
+                  <a:srgbClr val="123274"/>
+                </a:solidFill>
+                <a:latin typeface="Segoe UI" panose="020B0502040204020203" pitchFamily="34" charset="0"/>
+                <a:cs typeface="Segoe UI" panose="020B0502040204020203" pitchFamily="34" charset="0"/>
+              </a:rPr>
+              <a:t>Graduado em Processamento de Dados pela FATEC</a:t>
+            </a:r>
+          </a:p>
+          <a:p>
+            <a:pPr marL="171450" indent="-171450">
+              <a:buFontTx/>
+              <a:buChar char="-"/>
+            </a:pPr>
+            <a:r>
+              <a:rPr lang="pt-BR" sz="1600" dirty="0">
+                <a:solidFill>
+                  <a:srgbClr val="123274"/>
+                </a:solidFill>
+                <a:latin typeface="Segoe UI" panose="020B0502040204020203" pitchFamily="34" charset="0"/>
+                <a:cs typeface="Segoe UI" panose="020B0502040204020203" pitchFamily="34" charset="0"/>
+              </a:rPr>
+              <a:t>Pós-graduado em Engenharia de Software pela Unicamp</a:t>
+            </a:r>
+          </a:p>
+          <a:p>
+            <a:pPr marL="171450" indent="-171450">
+              <a:buFontTx/>
+              <a:buChar char="-"/>
+            </a:pPr>
+            <a:r>
+              <a:rPr lang="pt-BR" sz="1600" dirty="0">
+                <a:solidFill>
+                  <a:srgbClr val="123274"/>
+                </a:solidFill>
+                <a:latin typeface="Segoe UI" panose="020B0502040204020203" pitchFamily="34" charset="0"/>
+                <a:cs typeface="Segoe UI" panose="020B0502040204020203" pitchFamily="34" charset="0"/>
+              </a:rPr>
+              <a:t>MBA em Gestão de Produtos e Projetos FACENS</a:t>
+            </a:r>
+          </a:p>
+          <a:p>
+            <a:pPr marL="171450" indent="-171450">
+              <a:buFontTx/>
+              <a:buChar char="-"/>
+            </a:pPr>
+            <a:r>
+              <a:rPr lang="pt-BR" sz="1600" dirty="0">
+                <a:solidFill>
+                  <a:srgbClr val="123274"/>
+                </a:solidFill>
+                <a:latin typeface="Segoe UI" panose="020B0502040204020203" pitchFamily="34" charset="0"/>
+                <a:cs typeface="Segoe UI" panose="020B0502040204020203" pitchFamily="34" charset="0"/>
+              </a:rPr>
+              <a:t>PSM I e PSPO I pela Scrum.org</a:t>
+            </a:r>
+          </a:p>
+          <a:p>
+            <a:pPr marL="171450" indent="-171450">
+              <a:buFontTx/>
+              <a:buChar char="-"/>
+            </a:pPr>
+            <a:r>
+              <a:rPr lang="pt-BR" sz="1600" dirty="0" err="1">
+                <a:solidFill>
+                  <a:srgbClr val="123274"/>
+                </a:solidFill>
+                <a:latin typeface="Segoe UI" panose="020B0502040204020203" pitchFamily="34" charset="0"/>
+                <a:cs typeface="Segoe UI" panose="020B0502040204020203" pitchFamily="34" charset="0"/>
+              </a:rPr>
+              <a:t>LeSS</a:t>
+            </a:r>
+            <a:r>
+              <a:rPr lang="pt-BR" sz="1600" dirty="0">
+                <a:solidFill>
+                  <a:srgbClr val="123274"/>
+                </a:solidFill>
+                <a:latin typeface="Segoe UI" panose="020B0502040204020203" pitchFamily="34" charset="0"/>
+                <a:cs typeface="Segoe UI" panose="020B0502040204020203" pitchFamily="34" charset="0"/>
+              </a:rPr>
+              <a:t> </a:t>
+            </a:r>
+            <a:r>
+              <a:rPr lang="pt-BR" sz="1600" dirty="0" err="1">
+                <a:solidFill>
+                  <a:srgbClr val="123274"/>
+                </a:solidFill>
+                <a:latin typeface="Segoe UI" panose="020B0502040204020203" pitchFamily="34" charset="0"/>
+                <a:cs typeface="Segoe UI" panose="020B0502040204020203" pitchFamily="34" charset="0"/>
+              </a:rPr>
+              <a:t>Practitioner</a:t>
+            </a:r>
+            <a:r>
+              <a:rPr lang="pt-BR" sz="1600" dirty="0">
+                <a:solidFill>
+                  <a:srgbClr val="123274"/>
+                </a:solidFill>
+                <a:latin typeface="Segoe UI" panose="020B0502040204020203" pitchFamily="34" charset="0"/>
+                <a:cs typeface="Segoe UI" panose="020B0502040204020203" pitchFamily="34" charset="0"/>
+              </a:rPr>
+              <a:t> </a:t>
+            </a:r>
+            <a:r>
+              <a:rPr lang="pt-BR" sz="1600" dirty="0" err="1">
+                <a:solidFill>
+                  <a:srgbClr val="123274"/>
+                </a:solidFill>
+                <a:latin typeface="Segoe UI" panose="020B0502040204020203" pitchFamily="34" charset="0"/>
+                <a:cs typeface="Segoe UI" panose="020B0502040204020203" pitchFamily="34" charset="0"/>
+              </a:rPr>
+              <a:t>Certified</a:t>
+            </a:r>
+            <a:endParaRPr lang="pt-BR" sz="1600" dirty="0">
               <a:solidFill>
-                <a:srgbClr val="FFFFFF"/>
+                <a:srgbClr val="123274"/>
               </a:solidFill>
               <a:latin typeface="Segoe UI" panose="020B0502040204020203" pitchFamily="34" charset="0"/>
               <a:cs typeface="Segoe UI" panose="020B0502040204020203" pitchFamily="34" charset="0"/>
             </a:endParaRPr>
           </a:p>
+          <a:p>
+            <a:endParaRPr lang="pt-BR" sz="1000" dirty="0"/>
+          </a:p>
+        </p:txBody>
+      </p:sp>
+      <p:sp>
+        <p:nvSpPr>
+          <p:cNvPr id="16" name="Rectangle 28">
+            <a:extLst>
+              <a:ext uri="{FF2B5EF4-FFF2-40B4-BE49-F238E27FC236}">
+                <a16:creationId xmlns:a16="http://schemas.microsoft.com/office/drawing/2014/main" id="{F8C1EF84-2BB4-4AA1-B3D8-11396B03FE81}"/>
+              </a:ext>
+            </a:extLst>
+          </p:cNvPr>
+          <p:cNvSpPr/>
+          <p:nvPr/>
+        </p:nvSpPr>
+        <p:spPr>
+          <a:xfrm>
+            <a:off x="7963994" y="4824153"/>
+            <a:ext cx="3824764" cy="307777"/>
+          </a:xfrm>
+          <a:prstGeom prst="rect">
+            <a:avLst/>
+          </a:prstGeom>
+        </p:spPr>
+        <p:txBody>
+          <a:bodyPr wrap="square">
+            <a:spAutoFit/>
+          </a:bodyPr>
+          <a:lstStyle/>
+          <a:p>
+            <a:r>
+              <a:rPr lang="en-GB" sz="1400" b="1" dirty="0">
+                <a:solidFill>
+                  <a:srgbClr val="123274"/>
+                </a:solidFill>
+                <a:latin typeface="Segoe UI" panose="020B0502040204020203" pitchFamily="34" charset="0"/>
+                <a:cs typeface="Segoe UI" panose="020B0502040204020203" pitchFamily="34" charset="0"/>
+              </a:rPr>
+              <a:t>linkedin.com/in/lucas-tavernaro-00b92222</a:t>
+            </a:r>
+            <a:endParaRPr lang="pt-BR" sz="1400" b="1" dirty="0">
+              <a:solidFill>
+                <a:srgbClr val="123274"/>
+              </a:solidFill>
+              <a:latin typeface="Segoe UI" panose="020B0502040204020203" pitchFamily="34" charset="0"/>
+              <a:cs typeface="Segoe UI" panose="020B0502040204020203" pitchFamily="34" charset="0"/>
+            </a:endParaRPr>
+          </a:p>
+        </p:txBody>
+      </p:sp>
+      <p:pic>
+        <p:nvPicPr>
+          <p:cNvPr id="20" name="Imagem 19" descr="Uma imagem contendo relógio, placa&#10;&#10;Descrição gerada automaticamente">
+            <a:extLst>
+              <a:ext uri="{FF2B5EF4-FFF2-40B4-BE49-F238E27FC236}">
+                <a16:creationId xmlns:a16="http://schemas.microsoft.com/office/drawing/2014/main" id="{BA580DFC-0C63-4C11-AABD-0C42A7B1A491}"/>
+              </a:ext>
+            </a:extLst>
+          </p:cNvPr>
+          <p:cNvPicPr>
+            <a:picLocks noChangeAspect="1"/>
+          </p:cNvPicPr>
+          <p:nvPr/>
+        </p:nvPicPr>
+        <p:blipFill>
+          <a:blip r:embed="rId4" cstate="print">
+            <a:extLst>
+              <a:ext uri="{28A0092B-C50C-407E-A947-70E740481C1C}">
+                <a14:useLocalDpi xmlns:a14="http://schemas.microsoft.com/office/drawing/2010/main" val="0"/>
+              </a:ext>
+            </a:extLst>
+          </a:blip>
+          <a:stretch>
+            <a:fillRect/>
+          </a:stretch>
+        </p:blipFill>
+        <p:spPr>
+          <a:xfrm>
+            <a:off x="7059782" y="4578823"/>
+            <a:ext cx="798438" cy="798438"/>
+          </a:xfrm>
+          <a:prstGeom prst="rect">
+            <a:avLst/>
+          </a:prstGeom>
+        </p:spPr>
+      </p:pic>
+      <p:pic>
+        <p:nvPicPr>
+          <p:cNvPr id="24" name="Imagem 23" descr="Uma imagem contendo texto, desenho&#10;&#10;Descrição gerada automaticamente">
+            <a:extLst>
+              <a:ext uri="{FF2B5EF4-FFF2-40B4-BE49-F238E27FC236}">
+                <a16:creationId xmlns:a16="http://schemas.microsoft.com/office/drawing/2014/main" id="{6F1EC373-3864-4CF1-B864-3A3117038C50}"/>
+              </a:ext>
+            </a:extLst>
+          </p:cNvPr>
+          <p:cNvPicPr>
+            <a:picLocks noChangeAspect="1"/>
+          </p:cNvPicPr>
+          <p:nvPr/>
+        </p:nvPicPr>
+        <p:blipFill>
+          <a:blip r:embed="rId5" cstate="print">
+            <a:extLst>
+              <a:ext uri="{28A0092B-C50C-407E-A947-70E740481C1C}">
+                <a14:useLocalDpi xmlns:a14="http://schemas.microsoft.com/office/drawing/2010/main" val="0"/>
+              </a:ext>
+            </a:extLst>
+          </a:blip>
+          <a:stretch>
+            <a:fillRect/>
+          </a:stretch>
+        </p:blipFill>
+        <p:spPr>
+          <a:xfrm>
+            <a:off x="8176658" y="2512873"/>
+            <a:ext cx="1082253" cy="419574"/>
+          </a:xfrm>
+          <a:prstGeom prst="rect">
+            <a:avLst/>
+          </a:prstGeom>
+        </p:spPr>
+      </p:pic>
+      <p:pic>
+        <p:nvPicPr>
+          <p:cNvPr id="4" name="Picture 3" descr="A picture containing person, sign&#10;&#10;Description automatically generated">
+            <a:extLst>
+              <a:ext uri="{FF2B5EF4-FFF2-40B4-BE49-F238E27FC236}">
+                <a16:creationId xmlns:a16="http://schemas.microsoft.com/office/drawing/2014/main" id="{226FE1D2-1FD5-4B34-B75E-808BCBDA4787}"/>
+              </a:ext>
+            </a:extLst>
+          </p:cNvPr>
+          <p:cNvPicPr>
+            <a:picLocks noChangeAspect="1"/>
+          </p:cNvPicPr>
+          <p:nvPr/>
+        </p:nvPicPr>
+        <p:blipFill rotWithShape="1">
+          <a:blip r:embed="rId6" cstate="print">
+            <a:extLst>
+              <a:ext uri="{28A0092B-C50C-407E-A947-70E740481C1C}">
+                <a14:useLocalDpi xmlns:a14="http://schemas.microsoft.com/office/drawing/2010/main" val="0"/>
+              </a:ext>
+            </a:extLst>
+          </a:blip>
+          <a:srcRect t="29445" b="24800"/>
+          <a:stretch/>
+        </p:blipFill>
+        <p:spPr>
+          <a:xfrm>
+            <a:off x="2627132" y="822267"/>
+            <a:ext cx="2048736" cy="1978930"/>
+          </a:xfrm>
+          <a:prstGeom prst="flowChartAlternateProcess">
+            <a:avLst/>
+          </a:prstGeom>
+        </p:spPr>
+      </p:pic>
+      <p:pic>
+        <p:nvPicPr>
+          <p:cNvPr id="5" name="Picture 4" descr="A close up of a sign&#10;&#10;Description automatically generated">
+            <a:extLst>
+              <a:ext uri="{FF2B5EF4-FFF2-40B4-BE49-F238E27FC236}">
+                <a16:creationId xmlns:a16="http://schemas.microsoft.com/office/drawing/2014/main" id="{6644B203-7B39-44D8-AD41-1224D91C6304}"/>
+              </a:ext>
+            </a:extLst>
+          </p:cNvPr>
+          <p:cNvPicPr>
+            <a:picLocks noChangeAspect="1"/>
+          </p:cNvPicPr>
+          <p:nvPr/>
+        </p:nvPicPr>
+        <p:blipFill>
+          <a:blip r:embed="rId7" cstate="print">
+            <a:duotone>
+              <a:schemeClr val="accent3">
+                <a:shade val="45000"/>
+                <a:satMod val="135000"/>
+              </a:schemeClr>
+              <a:prstClr val="white"/>
+            </a:duotone>
+            <a:extLst>
+              <a:ext uri="{28A0092B-C50C-407E-A947-70E740481C1C}">
+                <a14:useLocalDpi xmlns:a14="http://schemas.microsoft.com/office/drawing/2010/main" val="0"/>
+              </a:ext>
+            </a:extLst>
+          </a:blip>
+          <a:stretch>
+            <a:fillRect/>
+          </a:stretch>
+        </p:blipFill>
+        <p:spPr>
+          <a:xfrm>
+            <a:off x="7099561" y="3629798"/>
+            <a:ext cx="718880" cy="692967"/>
+          </a:xfrm>
+          <a:prstGeom prst="rect">
+            <a:avLst/>
+          </a:prstGeom>
+        </p:spPr>
+      </p:pic>
+      <p:sp>
+        <p:nvSpPr>
+          <p:cNvPr id="6" name="Rectangle 5">
+            <a:extLst>
+              <a:ext uri="{FF2B5EF4-FFF2-40B4-BE49-F238E27FC236}">
+                <a16:creationId xmlns:a16="http://schemas.microsoft.com/office/drawing/2014/main" id="{DD0FB56D-2D34-4723-882D-8949FE2A2404}"/>
+              </a:ext>
+            </a:extLst>
+          </p:cNvPr>
+          <p:cNvSpPr/>
+          <p:nvPr/>
+        </p:nvSpPr>
+        <p:spPr>
+          <a:xfrm>
+            <a:off x="7963994" y="3791615"/>
+            <a:ext cx="3244574" cy="307777"/>
+          </a:xfrm>
+          <a:prstGeom prst="rect">
+            <a:avLst/>
+          </a:prstGeom>
+        </p:spPr>
+        <p:txBody>
+          <a:bodyPr wrap="square">
+            <a:spAutoFit/>
+          </a:bodyPr>
+          <a:lstStyle/>
+          <a:p>
+            <a:r>
+              <a:rPr lang="pt-BR" sz="1400" b="1" dirty="0">
+                <a:solidFill>
+                  <a:srgbClr val="123274"/>
+                </a:solidFill>
+                <a:latin typeface="Segoe UI" panose="020B0502040204020203" pitchFamily="34" charset="0"/>
+                <a:cs typeface="Segoe UI" panose="020B0502040204020203" pitchFamily="34" charset="0"/>
+              </a:rPr>
+              <a:t>lucas.Tavernaro@gft.com</a:t>
+            </a:r>
+          </a:p>
         </p:txBody>
       </p:sp>
     </p:spTree>
+    <p:extLst>
+      <p:ext uri="{BB962C8B-B14F-4D97-AF65-F5344CB8AC3E}">
+        <p14:creationId xmlns:p14="http://schemas.microsoft.com/office/powerpoint/2010/main" val="2069147805"/>
+      </p:ext>
+    </p:extLst>
   </p:cSld>
   <p:clrMapOvr>
     <a:masterClrMapping/>
   </p:clrMapOvr>
   <p:transition>
-    <p:fade thruBlk="1"/>
+    <p:fade/>
   </p:transition>
 </p:sld>
 </file>
@@ -6066,12 +6599,37 @@
           <a:chExt cx="0" cy="0"/>
         </a:xfrm>
       </p:grpSpPr>
+      <p:sp>
+        <p:nvSpPr>
+          <p:cNvPr id="2" name="Título 1"/>
+          <p:cNvSpPr>
+            <a:spLocks noGrp="1"/>
+          </p:cNvSpPr>
+          <p:nvPr>
+            <p:ph type="title"/>
+          </p:nvPr>
+        </p:nvSpPr>
+        <p:spPr/>
+        <p:txBody>
+          <a:bodyPr/>
+          <a:lstStyle/>
+          <a:p>
+            <a:r>
+              <a:rPr lang="pt-BR" dirty="0">
+                <a:latin typeface="Segoe UI" panose="020B0502040204020203" pitchFamily="34" charset="0"/>
+                <a:cs typeface="Segoe UI" panose="020B0502040204020203" pitchFamily="34" charset="0"/>
+              </a:rPr>
+              <a:t>Breve apresentação</a:t>
+            </a:r>
+          </a:p>
+        </p:txBody>
+      </p:sp>
       <p:pic>
         <p:nvPicPr>
-          <p:cNvPr id="6" name="Picture 5" descr="A screenshot of a cell phone&#10;&#10;Description automatically generated">
+          <p:cNvPr id="7" name="Picture 9" descr="A person smiling for the camera&#10;&#10;Description automatically generated">
             <a:extLst>
               <a:ext uri="{FF2B5EF4-FFF2-40B4-BE49-F238E27FC236}">
-                <a16:creationId xmlns:a16="http://schemas.microsoft.com/office/drawing/2014/main" id="{8BDEB937-3199-44ED-B4EF-B17901183EAA}"/>
+                <a16:creationId xmlns:a16="http://schemas.microsoft.com/office/drawing/2014/main" id="{A075A0A4-2D5E-4B5C-812B-D60F51EBF611}"/>
               </a:ext>
             </a:extLst>
           </p:cNvPr>
@@ -6080,7 +6638,7 @@
           </p:cNvPicPr>
           <p:nvPr/>
         </p:nvPicPr>
-        <p:blipFill rotWithShape="1">
+        <p:blipFill>
           <a:blip r:embed="rId2">
             <a:extLst>
               <a:ext uri="{28A0092B-C50C-407E-A947-70E740481C1C}">
@@ -6088,19 +6646,696 @@
               </a:ext>
             </a:extLst>
           </a:blip>
-          <a:srcRect l="14452" t="10795" r="13267" b="49339"/>
-          <a:stretch/>
+          <a:stretch>
+            <a:fillRect/>
+          </a:stretch>
         </p:blipFill>
         <p:spPr>
           <a:xfrm>
-            <a:off x="1461575" y="860708"/>
-            <a:ext cx="3175000" cy="1314737"/>
-          </a:xfrm>
-          <a:prstGeom prst="rect">
+            <a:off x="2676943" y="881432"/>
+            <a:ext cx="1949121" cy="1909181"/>
+          </a:xfrm>
+          <a:prstGeom prst="ellipse">
             <a:avLst/>
           </a:prstGeom>
         </p:spPr>
       </p:pic>
+      <p:sp>
+        <p:nvSpPr>
+          <p:cNvPr id="8" name="Rectangle 12">
+            <a:extLst>
+              <a:ext uri="{FF2B5EF4-FFF2-40B4-BE49-F238E27FC236}">
+                <a16:creationId xmlns:a16="http://schemas.microsoft.com/office/drawing/2014/main" id="{3D787F54-2FF9-467A-B9AF-F0E3D03C9E05}"/>
+              </a:ext>
+            </a:extLst>
+          </p:cNvPr>
+          <p:cNvSpPr/>
+          <p:nvPr/>
+        </p:nvSpPr>
+        <p:spPr>
+          <a:xfrm>
+            <a:off x="2330692" y="2932447"/>
+            <a:ext cx="2384755" cy="369332"/>
+          </a:xfrm>
+          <a:prstGeom prst="rect">
+            <a:avLst/>
+          </a:prstGeom>
+        </p:spPr>
+        <p:txBody>
+          <a:bodyPr wrap="none">
+            <a:spAutoFit/>
+          </a:bodyPr>
+          <a:lstStyle/>
+          <a:p>
+            <a:r>
+              <a:rPr lang="pt-BR" dirty="0">
+                <a:solidFill>
+                  <a:srgbClr val="123274"/>
+                </a:solidFill>
+                <a:latin typeface="Segoe UI" panose="020B0502040204020203" pitchFamily="34" charset="0"/>
+                <a:cs typeface="Segoe UI" panose="020B0502040204020203" pitchFamily="34" charset="0"/>
+              </a:rPr>
+              <a:t>Paulo Henrique Kolbe</a:t>
+            </a:r>
+          </a:p>
+        </p:txBody>
+      </p:sp>
+      <p:sp>
+        <p:nvSpPr>
+          <p:cNvPr id="9" name="Rectangle 16">
+            <a:extLst>
+              <a:ext uri="{FF2B5EF4-FFF2-40B4-BE49-F238E27FC236}">
+                <a16:creationId xmlns:a16="http://schemas.microsoft.com/office/drawing/2014/main" id="{7FC4B791-201E-4556-8285-DCC8E99EF699}"/>
+              </a:ext>
+            </a:extLst>
+          </p:cNvPr>
+          <p:cNvSpPr/>
+          <p:nvPr/>
+        </p:nvSpPr>
+        <p:spPr>
+          <a:xfrm>
+            <a:off x="7517071" y="2085565"/>
+            <a:ext cx="2401427" cy="369332"/>
+          </a:xfrm>
+          <a:prstGeom prst="rect">
+            <a:avLst/>
+          </a:prstGeom>
+        </p:spPr>
+        <p:txBody>
+          <a:bodyPr wrap="none">
+            <a:spAutoFit/>
+          </a:bodyPr>
+          <a:lstStyle/>
+          <a:p>
+            <a:r>
+              <a:rPr lang="pt-BR" dirty="0">
+                <a:solidFill>
+                  <a:srgbClr val="123274"/>
+                </a:solidFill>
+                <a:latin typeface="Segoe UI" panose="020B0502040204020203" pitchFamily="34" charset="0"/>
+                <a:cs typeface="Segoe UI" panose="020B0502040204020203" pitchFamily="34" charset="0"/>
+              </a:rPr>
+              <a:t>Arquiteto de soluções</a:t>
+            </a:r>
+          </a:p>
+        </p:txBody>
+      </p:sp>
+      <p:pic>
+        <p:nvPicPr>
+          <p:cNvPr id="11" name="Picture 18" descr="A close up of a logo&#10;&#10;Description automatically generated">
+            <a:extLst>
+              <a:ext uri="{FF2B5EF4-FFF2-40B4-BE49-F238E27FC236}">
+                <a16:creationId xmlns:a16="http://schemas.microsoft.com/office/drawing/2014/main" id="{F5D9E358-98FE-4F04-8C12-307454710702}"/>
+              </a:ext>
+            </a:extLst>
+          </p:cNvPr>
+          <p:cNvPicPr>
+            <a:picLocks noChangeAspect="1"/>
+          </p:cNvPicPr>
+          <p:nvPr/>
+        </p:nvPicPr>
+        <p:blipFill>
+          <a:blip r:embed="rId3" cstate="print">
+            <a:extLst>
+              <a:ext uri="{28A0092B-C50C-407E-A947-70E740481C1C}">
+                <a14:useLocalDpi xmlns:a14="http://schemas.microsoft.com/office/drawing/2010/main" val="0"/>
+              </a:ext>
+            </a:extLst>
+          </a:blip>
+          <a:stretch>
+            <a:fillRect/>
+          </a:stretch>
+        </p:blipFill>
+        <p:spPr>
+          <a:xfrm>
+            <a:off x="8365711" y="1243153"/>
+            <a:ext cx="704148" cy="776200"/>
+          </a:xfrm>
+          <a:prstGeom prst="rect">
+            <a:avLst/>
+          </a:prstGeom>
+        </p:spPr>
+      </p:pic>
+      <p:pic>
+        <p:nvPicPr>
+          <p:cNvPr id="12" name="Picture 22" descr="A close up of a logo&#10;&#10;Description automatically generated">
+            <a:extLst>
+              <a:ext uri="{FF2B5EF4-FFF2-40B4-BE49-F238E27FC236}">
+                <a16:creationId xmlns:a16="http://schemas.microsoft.com/office/drawing/2014/main" id="{B87281B2-2B96-47E1-B3F1-91FA58D9B705}"/>
+              </a:ext>
+            </a:extLst>
+          </p:cNvPr>
+          <p:cNvPicPr>
+            <a:picLocks noChangeAspect="1"/>
+          </p:cNvPicPr>
+          <p:nvPr/>
+        </p:nvPicPr>
+        <p:blipFill>
+          <a:blip r:embed="rId4" cstate="print">
+            <a:extLst>
+              <a:ext uri="{28A0092B-C50C-407E-A947-70E740481C1C}">
+                <a14:useLocalDpi xmlns:a14="http://schemas.microsoft.com/office/drawing/2010/main" val="0"/>
+              </a:ext>
+            </a:extLst>
+          </a:blip>
+          <a:stretch>
+            <a:fillRect/>
+          </a:stretch>
+        </p:blipFill>
+        <p:spPr>
+          <a:xfrm>
+            <a:off x="3306777" y="3773093"/>
+            <a:ext cx="689449" cy="692967"/>
+          </a:xfrm>
+          <a:prstGeom prst="rect">
+            <a:avLst/>
+          </a:prstGeom>
+        </p:spPr>
+      </p:pic>
+      <p:sp>
+        <p:nvSpPr>
+          <p:cNvPr id="13" name="Rectangle 23">
+            <a:extLst>
+              <a:ext uri="{FF2B5EF4-FFF2-40B4-BE49-F238E27FC236}">
+                <a16:creationId xmlns:a16="http://schemas.microsoft.com/office/drawing/2014/main" id="{45C55203-B064-4C1B-B2D6-C231252269BF}"/>
+              </a:ext>
+            </a:extLst>
+          </p:cNvPr>
+          <p:cNvSpPr/>
+          <p:nvPr/>
+        </p:nvSpPr>
+        <p:spPr>
+          <a:xfrm>
+            <a:off x="915197" y="4558405"/>
+            <a:ext cx="5472607" cy="1231106"/>
+          </a:xfrm>
+          <a:prstGeom prst="rect">
+            <a:avLst/>
+          </a:prstGeom>
+        </p:spPr>
+        <p:txBody>
+          <a:bodyPr wrap="square">
+            <a:spAutoFit/>
+          </a:bodyPr>
+          <a:lstStyle/>
+          <a:p>
+            <a:pPr marL="171450" indent="-171450">
+              <a:buFontTx/>
+              <a:buChar char="-"/>
+            </a:pPr>
+            <a:r>
+              <a:rPr lang="pt-BR" sz="1600" dirty="0">
+                <a:solidFill>
+                  <a:srgbClr val="123274"/>
+                </a:solidFill>
+                <a:latin typeface="Segoe UI" panose="020B0502040204020203" pitchFamily="34" charset="0"/>
+                <a:cs typeface="Segoe UI" panose="020B0502040204020203" pitchFamily="34" charset="0"/>
+              </a:rPr>
+              <a:t>Graduado em Ciências da Computação pela FITO</a:t>
+            </a:r>
+          </a:p>
+          <a:p>
+            <a:pPr marL="171450" indent="-171450">
+              <a:buFontTx/>
+              <a:buChar char="-"/>
+            </a:pPr>
+            <a:r>
+              <a:rPr lang="pt-BR" sz="1600" dirty="0">
+                <a:solidFill>
+                  <a:srgbClr val="123274"/>
+                </a:solidFill>
+                <a:latin typeface="Segoe UI" panose="020B0502040204020203" pitchFamily="34" charset="0"/>
+                <a:cs typeface="Segoe UI" panose="020B0502040204020203" pitchFamily="34" charset="0"/>
+              </a:rPr>
+              <a:t>Pós-graduado em Engenharia de Software pela Unicamp</a:t>
+            </a:r>
+          </a:p>
+          <a:p>
+            <a:pPr marL="171450" indent="-171450">
+              <a:buFontTx/>
+              <a:buChar char="-"/>
+            </a:pPr>
+            <a:r>
+              <a:rPr lang="pt-BR" sz="1600" dirty="0">
+                <a:solidFill>
+                  <a:srgbClr val="123274"/>
+                </a:solidFill>
+                <a:latin typeface="Segoe UI" panose="020B0502040204020203" pitchFamily="34" charset="0"/>
+                <a:cs typeface="Segoe UI" panose="020B0502040204020203" pitchFamily="34" charset="0"/>
+              </a:rPr>
+              <a:t>Pós-graduando em Arquitetura de Software pela PUC</a:t>
+            </a:r>
+          </a:p>
+          <a:p>
+            <a:pPr marL="171450" indent="-171450">
+              <a:buFontTx/>
+              <a:buChar char="-"/>
+            </a:pPr>
+            <a:r>
+              <a:rPr lang="pt-BR" sz="1600" dirty="0">
+                <a:solidFill>
+                  <a:srgbClr val="123274"/>
+                </a:solidFill>
+                <a:latin typeface="Segoe UI" panose="020B0502040204020203" pitchFamily="34" charset="0"/>
+                <a:cs typeface="Segoe UI" panose="020B0502040204020203" pitchFamily="34" charset="0"/>
+              </a:rPr>
+              <a:t>KMP I pela </a:t>
+            </a:r>
+            <a:r>
+              <a:rPr lang="pt-BR" sz="1600" dirty="0" err="1">
+                <a:solidFill>
+                  <a:srgbClr val="123274"/>
+                </a:solidFill>
+                <a:latin typeface="Segoe UI" panose="020B0502040204020203" pitchFamily="34" charset="0"/>
+                <a:cs typeface="Segoe UI" panose="020B0502040204020203" pitchFamily="34" charset="0"/>
+              </a:rPr>
+              <a:t>Aspercom</a:t>
+            </a:r>
+            <a:endParaRPr lang="pt-BR" sz="1600" dirty="0">
+              <a:solidFill>
+                <a:srgbClr val="123274"/>
+              </a:solidFill>
+              <a:latin typeface="Segoe UI" panose="020B0502040204020203" pitchFamily="34" charset="0"/>
+              <a:cs typeface="Segoe UI" panose="020B0502040204020203" pitchFamily="34" charset="0"/>
+            </a:endParaRPr>
+          </a:p>
+          <a:p>
+            <a:endParaRPr lang="pt-BR" sz="1000" dirty="0"/>
+          </a:p>
+        </p:txBody>
+      </p:sp>
+      <p:sp>
+        <p:nvSpPr>
+          <p:cNvPr id="16" name="Rectangle 28">
+            <a:extLst>
+              <a:ext uri="{FF2B5EF4-FFF2-40B4-BE49-F238E27FC236}">
+                <a16:creationId xmlns:a16="http://schemas.microsoft.com/office/drawing/2014/main" id="{F8C1EF84-2BB4-4AA1-B3D8-11396B03FE81}"/>
+              </a:ext>
+            </a:extLst>
+          </p:cNvPr>
+          <p:cNvSpPr/>
+          <p:nvPr/>
+        </p:nvSpPr>
+        <p:spPr>
+          <a:xfrm>
+            <a:off x="7776485" y="5236403"/>
+            <a:ext cx="2534220" cy="307777"/>
+          </a:xfrm>
+          <a:prstGeom prst="rect">
+            <a:avLst/>
+          </a:prstGeom>
+        </p:spPr>
+        <p:txBody>
+          <a:bodyPr wrap="square">
+            <a:spAutoFit/>
+          </a:bodyPr>
+          <a:lstStyle/>
+          <a:p>
+            <a:r>
+              <a:rPr lang="pt-BR" sz="1400" b="1" dirty="0">
+                <a:solidFill>
+                  <a:srgbClr val="123274"/>
+                </a:solidFill>
+                <a:latin typeface="Segoe UI" panose="020B0502040204020203" pitchFamily="34" charset="0"/>
+                <a:cs typeface="Segoe UI" panose="020B0502040204020203" pitchFamily="34" charset="0"/>
+              </a:rPr>
+              <a:t>linkedin.com/in/</a:t>
+            </a:r>
+            <a:r>
+              <a:rPr lang="pt-BR" sz="1400" b="1" dirty="0" err="1">
+                <a:solidFill>
+                  <a:srgbClr val="123274"/>
+                </a:solidFill>
+                <a:latin typeface="Segoe UI" panose="020B0502040204020203" pitchFamily="34" charset="0"/>
+                <a:cs typeface="Segoe UI" panose="020B0502040204020203" pitchFamily="34" charset="0"/>
+              </a:rPr>
+              <a:t>paulokolbe</a:t>
+            </a:r>
+            <a:endParaRPr lang="pt-BR" sz="1400" b="1" dirty="0">
+              <a:solidFill>
+                <a:srgbClr val="123274"/>
+              </a:solidFill>
+              <a:latin typeface="Segoe UI" panose="020B0502040204020203" pitchFamily="34" charset="0"/>
+              <a:cs typeface="Segoe UI" panose="020B0502040204020203" pitchFamily="34" charset="0"/>
+            </a:endParaRPr>
+          </a:p>
+        </p:txBody>
+      </p:sp>
+      <p:sp>
+        <p:nvSpPr>
+          <p:cNvPr id="17" name="Rectangle 29">
+            <a:extLst>
+              <a:ext uri="{FF2B5EF4-FFF2-40B4-BE49-F238E27FC236}">
+                <a16:creationId xmlns:a16="http://schemas.microsoft.com/office/drawing/2014/main" id="{5DB73E1B-3B0C-4E16-ADFE-D81A387CD775}"/>
+              </a:ext>
+            </a:extLst>
+          </p:cNvPr>
+          <p:cNvSpPr/>
+          <p:nvPr/>
+        </p:nvSpPr>
+        <p:spPr>
+          <a:xfrm>
+            <a:off x="7776485" y="4359949"/>
+            <a:ext cx="1297663" cy="307777"/>
+          </a:xfrm>
+          <a:prstGeom prst="rect">
+            <a:avLst/>
+          </a:prstGeom>
+        </p:spPr>
+        <p:txBody>
+          <a:bodyPr wrap="square">
+            <a:spAutoFit/>
+          </a:bodyPr>
+          <a:lstStyle/>
+          <a:p>
+            <a:r>
+              <a:rPr lang="pt-BR" sz="1400" b="1" dirty="0">
+                <a:solidFill>
+                  <a:srgbClr val="123274"/>
+                </a:solidFill>
+                <a:latin typeface="Segoe UI" panose="020B0502040204020203" pitchFamily="34" charset="0"/>
+                <a:cs typeface="Segoe UI" panose="020B0502040204020203" pitchFamily="34" charset="0"/>
+              </a:rPr>
+              <a:t>@</a:t>
+            </a:r>
+            <a:r>
+              <a:rPr lang="pt-BR" sz="1400" b="1" dirty="0" err="1">
+                <a:solidFill>
+                  <a:srgbClr val="123274"/>
+                </a:solidFill>
+                <a:latin typeface="Segoe UI" panose="020B0502040204020203" pitchFamily="34" charset="0"/>
+                <a:cs typeface="Segoe UI" panose="020B0502040204020203" pitchFamily="34" charset="0"/>
+              </a:rPr>
+              <a:t>paulokolbe</a:t>
+            </a:r>
+            <a:endParaRPr lang="pt-BR" sz="1400" b="1" dirty="0">
+              <a:solidFill>
+                <a:srgbClr val="123274"/>
+              </a:solidFill>
+              <a:latin typeface="Segoe UI" panose="020B0502040204020203" pitchFamily="34" charset="0"/>
+              <a:cs typeface="Segoe UI" panose="020B0502040204020203" pitchFamily="34" charset="0"/>
+            </a:endParaRPr>
+          </a:p>
+        </p:txBody>
+      </p:sp>
+      <p:pic>
+        <p:nvPicPr>
+          <p:cNvPr id="20" name="Imagem 19" descr="Uma imagem contendo relógio, placa&#10;&#10;Descrição gerada automaticamente">
+            <a:extLst>
+              <a:ext uri="{FF2B5EF4-FFF2-40B4-BE49-F238E27FC236}">
+                <a16:creationId xmlns:a16="http://schemas.microsoft.com/office/drawing/2014/main" id="{BA580DFC-0C63-4C11-AABD-0C42A7B1A491}"/>
+              </a:ext>
+            </a:extLst>
+          </p:cNvPr>
+          <p:cNvPicPr>
+            <a:picLocks noChangeAspect="1"/>
+          </p:cNvPicPr>
+          <p:nvPr/>
+        </p:nvPicPr>
+        <p:blipFill>
+          <a:blip r:embed="rId5" cstate="print">
+            <a:extLst>
+              <a:ext uri="{28A0092B-C50C-407E-A947-70E740481C1C}">
+                <a14:useLocalDpi xmlns:a14="http://schemas.microsoft.com/office/drawing/2010/main" val="0"/>
+              </a:ext>
+            </a:extLst>
+          </a:blip>
+          <a:stretch>
+            <a:fillRect/>
+          </a:stretch>
+        </p:blipFill>
+        <p:spPr>
+          <a:xfrm>
+            <a:off x="6855316" y="4991073"/>
+            <a:ext cx="798438" cy="798438"/>
+          </a:xfrm>
+          <a:prstGeom prst="rect">
+            <a:avLst/>
+          </a:prstGeom>
+        </p:spPr>
+      </p:pic>
+      <p:pic>
+        <p:nvPicPr>
+          <p:cNvPr id="22" name="Imagem 21" descr="Uma imagem contendo pássaro, avião, flor&#10;&#10;Descrição gerada automaticamente">
+            <a:extLst>
+              <a:ext uri="{FF2B5EF4-FFF2-40B4-BE49-F238E27FC236}">
+                <a16:creationId xmlns:a16="http://schemas.microsoft.com/office/drawing/2014/main" id="{A34A2E8A-60BC-42A1-9878-3E082A1EAA5E}"/>
+              </a:ext>
+            </a:extLst>
+          </p:cNvPr>
+          <p:cNvPicPr>
+            <a:picLocks noChangeAspect="1"/>
+          </p:cNvPicPr>
+          <p:nvPr/>
+        </p:nvPicPr>
+        <p:blipFill>
+          <a:blip r:embed="rId6" cstate="print">
+            <a:extLst>
+              <a:ext uri="{28A0092B-C50C-407E-A947-70E740481C1C}">
+                <a14:useLocalDpi xmlns:a14="http://schemas.microsoft.com/office/drawing/2010/main" val="0"/>
+              </a:ext>
+            </a:extLst>
+          </a:blip>
+          <a:stretch>
+            <a:fillRect/>
+          </a:stretch>
+        </p:blipFill>
+        <p:spPr>
+          <a:xfrm>
+            <a:off x="6903505" y="4167355"/>
+            <a:ext cx="692967" cy="692967"/>
+          </a:xfrm>
+          <a:prstGeom prst="rect">
+            <a:avLst/>
+          </a:prstGeom>
+        </p:spPr>
+      </p:pic>
+      <p:pic>
+        <p:nvPicPr>
+          <p:cNvPr id="24" name="Imagem 23" descr="Uma imagem contendo texto, desenho&#10;&#10;Descrição gerada automaticamente">
+            <a:extLst>
+              <a:ext uri="{FF2B5EF4-FFF2-40B4-BE49-F238E27FC236}">
+                <a16:creationId xmlns:a16="http://schemas.microsoft.com/office/drawing/2014/main" id="{6F1EC373-3864-4CF1-B864-3A3117038C50}"/>
+              </a:ext>
+            </a:extLst>
+          </p:cNvPr>
+          <p:cNvPicPr>
+            <a:picLocks noChangeAspect="1"/>
+          </p:cNvPicPr>
+          <p:nvPr/>
+        </p:nvPicPr>
+        <p:blipFill>
+          <a:blip r:embed="rId7" cstate="print">
+            <a:extLst>
+              <a:ext uri="{28A0092B-C50C-407E-A947-70E740481C1C}">
+                <a14:useLocalDpi xmlns:a14="http://schemas.microsoft.com/office/drawing/2010/main" val="0"/>
+              </a:ext>
+            </a:extLst>
+          </a:blip>
+          <a:stretch>
+            <a:fillRect/>
+          </a:stretch>
+        </p:blipFill>
+        <p:spPr>
+          <a:xfrm>
+            <a:off x="8176658" y="2512873"/>
+            <a:ext cx="1082253" cy="419574"/>
+          </a:xfrm>
+          <a:prstGeom prst="rect">
+            <a:avLst/>
+          </a:prstGeom>
+        </p:spPr>
+      </p:pic>
+      <p:pic>
+        <p:nvPicPr>
+          <p:cNvPr id="14" name="Picture 13" descr="A close up of a sign&#10;&#10;Description automatically generated">
+            <a:extLst>
+              <a:ext uri="{FF2B5EF4-FFF2-40B4-BE49-F238E27FC236}">
+                <a16:creationId xmlns:a16="http://schemas.microsoft.com/office/drawing/2014/main" id="{4719C197-3E5F-44F9-89CB-861D003F13D7}"/>
+              </a:ext>
+            </a:extLst>
+          </p:cNvPr>
+          <p:cNvPicPr>
+            <a:picLocks noChangeAspect="1"/>
+          </p:cNvPicPr>
+          <p:nvPr/>
+        </p:nvPicPr>
+        <p:blipFill>
+          <a:blip r:embed="rId8" cstate="print">
+            <a:duotone>
+              <a:schemeClr val="accent3">
+                <a:shade val="45000"/>
+                <a:satMod val="135000"/>
+              </a:schemeClr>
+              <a:prstClr val="white"/>
+            </a:duotone>
+            <a:extLst>
+              <a:ext uri="{28A0092B-C50C-407E-A947-70E740481C1C}">
+                <a14:useLocalDpi xmlns:a14="http://schemas.microsoft.com/office/drawing/2010/main" val="0"/>
+              </a:ext>
+            </a:extLst>
+          </a:blip>
+          <a:stretch>
+            <a:fillRect/>
+          </a:stretch>
+        </p:blipFill>
+        <p:spPr>
+          <a:xfrm>
+            <a:off x="6887729" y="3311126"/>
+            <a:ext cx="718880" cy="692967"/>
+          </a:xfrm>
+          <a:prstGeom prst="rect">
+            <a:avLst/>
+          </a:prstGeom>
+        </p:spPr>
+      </p:pic>
+      <p:sp>
+        <p:nvSpPr>
+          <p:cNvPr id="15" name="Rectangle 14">
+            <a:extLst>
+              <a:ext uri="{FF2B5EF4-FFF2-40B4-BE49-F238E27FC236}">
+                <a16:creationId xmlns:a16="http://schemas.microsoft.com/office/drawing/2014/main" id="{4015656C-C2D9-4296-A2E9-CC8BE5F7A1F0}"/>
+              </a:ext>
+            </a:extLst>
+          </p:cNvPr>
+          <p:cNvSpPr/>
+          <p:nvPr/>
+        </p:nvSpPr>
+        <p:spPr>
+          <a:xfrm>
+            <a:off x="7776485" y="3617777"/>
+            <a:ext cx="3244574" cy="307777"/>
+          </a:xfrm>
+          <a:prstGeom prst="rect">
+            <a:avLst/>
+          </a:prstGeom>
+        </p:spPr>
+        <p:txBody>
+          <a:bodyPr wrap="square">
+            <a:spAutoFit/>
+          </a:bodyPr>
+          <a:lstStyle/>
+          <a:p>
+            <a:r>
+              <a:rPr lang="pt-BR" sz="1400" b="1" dirty="0">
+                <a:solidFill>
+                  <a:srgbClr val="123274"/>
+                </a:solidFill>
+                <a:latin typeface="Segoe UI" panose="020B0502040204020203" pitchFamily="34" charset="0"/>
+                <a:cs typeface="Segoe UI" panose="020B0502040204020203" pitchFamily="34" charset="0"/>
+              </a:rPr>
+              <a:t>paulo.kolbe@gft.com</a:t>
+            </a:r>
+          </a:p>
+        </p:txBody>
+      </p:sp>
+    </p:spTree>
+    <p:extLst>
+      <p:ext uri="{BB962C8B-B14F-4D97-AF65-F5344CB8AC3E}">
+        <p14:creationId xmlns:p14="http://schemas.microsoft.com/office/powerpoint/2010/main" val="1560527759"/>
+      </p:ext>
+    </p:extLst>
+  </p:cSld>
+  <p:clrMapOvr>
+    <a:masterClrMapping/>
+  </p:clrMapOvr>
+  <p:transition>
+    <p:fade/>
+  </p:transition>
+</p:sld>
+</file>
+
+<file path=ppt/slides/slide4.xml><?xml version="1.0" encoding="utf-8"?>
+<p:sld xmlns:a="http://schemas.openxmlformats.org/drawingml/2006/main" xmlns:r="http://schemas.openxmlformats.org/officeDocument/2006/relationships" xmlns:p="http://schemas.openxmlformats.org/presentationml/2006/main">
+  <p:cSld>
+    <p:spTree>
+      <p:nvGrpSpPr>
+        <p:cNvPr id="1" name=""/>
+        <p:cNvGrpSpPr/>
+        <p:nvPr/>
+      </p:nvGrpSpPr>
+      <p:grpSpPr>
+        <a:xfrm>
+          <a:off x="0" y="0"/>
+          <a:ext cx="0" cy="0"/>
+          <a:chOff x="0" y="0"/>
+          <a:chExt cx="0" cy="0"/>
+        </a:xfrm>
+      </p:grpSpPr>
+      <p:sp>
+        <p:nvSpPr>
+          <p:cNvPr id="6" name="Rectangle 13"/>
+          <p:cNvSpPr/>
+          <p:nvPr/>
+        </p:nvSpPr>
+        <p:spPr>
+          <a:xfrm>
+            <a:off x="335360" y="3076901"/>
+            <a:ext cx="4680520" cy="639855"/>
+          </a:xfrm>
+          <a:prstGeom prst="rect">
+            <a:avLst/>
+          </a:prstGeom>
+        </p:spPr>
+        <p:txBody>
+          <a:bodyPr wrap="square" anchor="ctr">
+            <a:spAutoFit/>
+          </a:bodyPr>
+          <a:lstStyle/>
+          <a:p>
+            <a:pPr lvl="0">
+              <a:lnSpc>
+                <a:spcPts val="4600"/>
+              </a:lnSpc>
+            </a:pPr>
+            <a:r>
+              <a:rPr lang="en-US" sz="3600" dirty="0" err="1">
+                <a:solidFill>
+                  <a:srgbClr val="FFFFFF"/>
+                </a:solidFill>
+                <a:latin typeface="Segoe UI" panose="020B0502040204020203" pitchFamily="34" charset="0"/>
+                <a:cs typeface="Segoe UI" panose="020B0502040204020203" pitchFamily="34" charset="0"/>
+              </a:rPr>
+              <a:t>Introdução</a:t>
+            </a:r>
+            <a:endParaRPr lang="en-US" sz="3600" dirty="0">
+              <a:solidFill>
+                <a:srgbClr val="FFFFFF"/>
+              </a:solidFill>
+              <a:latin typeface="Segoe UI" panose="020B0502040204020203" pitchFamily="34" charset="0"/>
+              <a:cs typeface="Segoe UI" panose="020B0502040204020203" pitchFamily="34" charset="0"/>
+            </a:endParaRPr>
+          </a:p>
+        </p:txBody>
+      </p:sp>
+    </p:spTree>
+  </p:cSld>
+  <p:clrMapOvr>
+    <a:masterClrMapping/>
+  </p:clrMapOvr>
+  <p:transition>
+    <p:fade thruBlk="1"/>
+  </p:transition>
+</p:sld>
+</file>
+
+<file path=ppt/slides/slide5.xml><?xml version="1.0" encoding="utf-8"?>
+<p:sld xmlns:a="http://schemas.openxmlformats.org/drawingml/2006/main" xmlns:r="http://schemas.openxmlformats.org/officeDocument/2006/relationships" xmlns:p="http://schemas.openxmlformats.org/presentationml/2006/main">
+  <p:cSld>
+    <p:spTree>
+      <p:nvGrpSpPr>
+        <p:cNvPr id="1" name=""/>
+        <p:cNvGrpSpPr/>
+        <p:nvPr/>
+      </p:nvGrpSpPr>
+      <p:grpSpPr>
+        <a:xfrm>
+          <a:off x="0" y="0"/>
+          <a:ext cx="0" cy="0"/>
+          <a:chOff x="0" y="0"/>
+          <a:chExt cx="0" cy="0"/>
+        </a:xfrm>
+      </p:grpSpPr>
       <p:pic>
         <p:nvPicPr>
           <p:cNvPr id="16" name="Picture 15" descr="A picture containing sitting, table&#10;&#10;Description automatically generated">
@@ -6116,7 +7351,7 @@
           <p:nvPr/>
         </p:nvPicPr>
         <p:blipFill>
-          <a:blip r:embed="rId3">
+          <a:blip r:embed="rId2">
             <a:extLst>
               <a:ext uri="{28A0092B-C50C-407E-A947-70E740481C1C}">
                 <a14:useLocalDpi xmlns:a14="http://schemas.microsoft.com/office/drawing/2010/main" val="0"/>
@@ -6197,7 +7432,7 @@
             <p:nvPr/>
           </p:nvPicPr>
           <p:blipFill>
-            <a:blip r:embed="rId4" cstate="print">
+            <a:blip r:embed="rId3" cstate="print">
               <a:extLst>
                 <a:ext uri="{28A0092B-C50C-407E-A947-70E740481C1C}">
                   <a14:useLocalDpi xmlns:a14="http://schemas.microsoft.com/office/drawing/2010/main" val="0"/>
@@ -6302,7 +7537,7 @@
           <p:nvPr/>
         </p:nvPicPr>
         <p:blipFill>
-          <a:blip r:embed="rId5" cstate="print">
+          <a:blip r:embed="rId4" cstate="print">
             <a:extLst>
               <a:ext uri="{28A0092B-C50C-407E-A947-70E740481C1C}">
                 <a14:useLocalDpi xmlns:a14="http://schemas.microsoft.com/office/drawing/2010/main" val="0"/>
@@ -6390,7 +7625,7 @@
             <p:nvPr/>
           </p:nvPicPr>
           <p:blipFill>
-            <a:blip r:embed="rId6">
+            <a:blip r:embed="rId5">
               <a:extLst>
                 <a:ext uri="{28A0092B-C50C-407E-A947-70E740481C1C}">
                   <a14:useLocalDpi xmlns:a14="http://schemas.microsoft.com/office/drawing/2010/main" val="0"/>
@@ -6479,7 +7714,7 @@
           <p:nvPr/>
         </p:nvPicPr>
         <p:blipFill>
-          <a:blip r:embed="rId7">
+          <a:blip r:embed="rId6">
             <a:extLst>
               <a:ext uri="{28A0092B-C50C-407E-A947-70E740481C1C}">
                 <a14:useLocalDpi xmlns:a14="http://schemas.microsoft.com/office/drawing/2010/main" val="0"/>
@@ -6494,6 +7729,41 @@
           <a:xfrm>
             <a:off x="7712799" y="3296097"/>
             <a:ext cx="3384376" cy="2380345"/>
+          </a:xfrm>
+          <a:prstGeom prst="rect">
+            <a:avLst/>
+          </a:prstGeom>
+        </p:spPr>
+      </p:pic>
+      <p:pic>
+        <p:nvPicPr>
+          <p:cNvPr id="6" name="Picture 5" descr="A screenshot of a cell phone&#10;&#10;Description automatically generated">
+            <a:extLst>
+              <a:ext uri="{FF2B5EF4-FFF2-40B4-BE49-F238E27FC236}">
+                <a16:creationId xmlns:a16="http://schemas.microsoft.com/office/drawing/2014/main" id="{8BDEB937-3199-44ED-B4EF-B17901183EAA}"/>
+              </a:ext>
+            </a:extLst>
+          </p:cNvPr>
+          <p:cNvPicPr>
+            <a:picLocks noChangeAspect="1"/>
+          </p:cNvPicPr>
+          <p:nvPr/>
+        </p:nvPicPr>
+        <p:blipFill rotWithShape="1">
+          <a:blip r:embed="rId7">
+            <a:extLst>
+              <a:ext uri="{28A0092B-C50C-407E-A947-70E740481C1C}">
+                <a14:useLocalDpi xmlns:a14="http://schemas.microsoft.com/office/drawing/2010/main" val="0"/>
+              </a:ext>
+            </a:extLst>
+          </a:blip>
+          <a:srcRect l="14452" t="10795" r="13267" b="49339"/>
+          <a:stretch/>
+        </p:blipFill>
+        <p:spPr>
+          <a:xfrm>
+            <a:off x="1461575" y="860708"/>
+            <a:ext cx="3175000" cy="1314737"/>
           </a:xfrm>
           <a:prstGeom prst="rect">
             <a:avLst/>
@@ -6558,487 +7828,6 @@
     <p:extLst>
       <p:ext uri="{BB962C8B-B14F-4D97-AF65-F5344CB8AC3E}">
         <p14:creationId xmlns:p14="http://schemas.microsoft.com/office/powerpoint/2010/main" val="2701864690"/>
-      </p:ext>
-    </p:extLst>
-  </p:cSld>
-  <p:clrMapOvr>
-    <a:masterClrMapping/>
-  </p:clrMapOvr>
-  <p:transition>
-    <p:fade/>
-  </p:transition>
-</p:sld>
-</file>
-
-<file path=ppt/slides/slide4.xml><?xml version="1.0" encoding="utf-8"?>
-<p:sld xmlns:a="http://schemas.openxmlformats.org/drawingml/2006/main" xmlns:r="http://schemas.openxmlformats.org/officeDocument/2006/relationships" xmlns:p="http://schemas.openxmlformats.org/presentationml/2006/main">
-  <p:cSld>
-    <p:spTree>
-      <p:nvGrpSpPr>
-        <p:cNvPr id="1" name=""/>
-        <p:cNvGrpSpPr/>
-        <p:nvPr/>
-      </p:nvGrpSpPr>
-      <p:grpSpPr>
-        <a:xfrm>
-          <a:off x="0" y="0"/>
-          <a:ext cx="0" cy="0"/>
-          <a:chOff x="0" y="0"/>
-          <a:chExt cx="0" cy="0"/>
-        </a:xfrm>
-      </p:grpSpPr>
-      <p:sp>
-        <p:nvSpPr>
-          <p:cNvPr id="6" name="Rectangle 13"/>
-          <p:cNvSpPr/>
-          <p:nvPr/>
-        </p:nvSpPr>
-        <p:spPr>
-          <a:xfrm>
-            <a:off x="335360" y="3077189"/>
-            <a:ext cx="9361040" cy="639278"/>
-          </a:xfrm>
-          <a:prstGeom prst="rect">
-            <a:avLst/>
-          </a:prstGeom>
-        </p:spPr>
-        <p:txBody>
-          <a:bodyPr wrap="square" anchor="ctr">
-            <a:spAutoFit/>
-          </a:bodyPr>
-          <a:lstStyle/>
-          <a:p>
-            <a:pPr lvl="0">
-              <a:lnSpc>
-                <a:spcPts val="4600"/>
-              </a:lnSpc>
-            </a:pPr>
-            <a:r>
-              <a:rPr lang="en-US" sz="3600" dirty="0" err="1">
-                <a:solidFill>
-                  <a:srgbClr val="FFFFFF"/>
-                </a:solidFill>
-                <a:latin typeface="Segoe UI" panose="020B0502040204020203" pitchFamily="34" charset="0"/>
-                <a:cs typeface="Segoe UI" panose="020B0502040204020203" pitchFamily="34" charset="0"/>
-              </a:rPr>
-              <a:t>Motivadores</a:t>
-            </a:r>
-            <a:r>
-              <a:rPr lang="en-US" sz="3600" dirty="0">
-                <a:solidFill>
-                  <a:srgbClr val="FFFFFF"/>
-                </a:solidFill>
-                <a:latin typeface="Segoe UI" panose="020B0502040204020203" pitchFamily="34" charset="0"/>
-                <a:cs typeface="Segoe UI" panose="020B0502040204020203" pitchFamily="34" charset="0"/>
-              </a:rPr>
-              <a:t> B3</a:t>
-            </a:r>
-          </a:p>
-        </p:txBody>
-      </p:sp>
-    </p:spTree>
-    <p:extLst>
-      <p:ext uri="{BB962C8B-B14F-4D97-AF65-F5344CB8AC3E}">
-        <p14:creationId xmlns:p14="http://schemas.microsoft.com/office/powerpoint/2010/main" val="2940308037"/>
-      </p:ext>
-    </p:extLst>
-  </p:cSld>
-  <p:clrMapOvr>
-    <a:masterClrMapping/>
-  </p:clrMapOvr>
-  <p:transition>
-    <p:fade thruBlk="1"/>
-  </p:transition>
-</p:sld>
-</file>
-
-<file path=ppt/slides/slide5.xml><?xml version="1.0" encoding="utf-8"?>
-<p:sld xmlns:a="http://schemas.openxmlformats.org/drawingml/2006/main" xmlns:r="http://schemas.openxmlformats.org/officeDocument/2006/relationships" xmlns:p="http://schemas.openxmlformats.org/presentationml/2006/main">
-  <p:cSld>
-    <p:spTree>
-      <p:nvGrpSpPr>
-        <p:cNvPr id="1" name=""/>
-        <p:cNvGrpSpPr/>
-        <p:nvPr/>
-      </p:nvGrpSpPr>
-      <p:grpSpPr>
-        <a:xfrm>
-          <a:off x="0" y="0"/>
-          <a:ext cx="0" cy="0"/>
-          <a:chOff x="0" y="0"/>
-          <a:chExt cx="0" cy="0"/>
-        </a:xfrm>
-      </p:grpSpPr>
-      <p:sp>
-        <p:nvSpPr>
-          <p:cNvPr id="2" name="Título 1"/>
-          <p:cNvSpPr>
-            <a:spLocks noGrp="1"/>
-          </p:cNvSpPr>
-          <p:nvPr>
-            <p:ph type="title"/>
-          </p:nvPr>
-        </p:nvSpPr>
-        <p:spPr/>
-        <p:txBody>
-          <a:bodyPr/>
-          <a:lstStyle/>
-          <a:p>
-            <a:r>
-              <a:rPr lang="pt-BR" dirty="0">
-                <a:latin typeface="Segoe UI" panose="020B0502040204020203" pitchFamily="34" charset="0"/>
-                <a:cs typeface="Segoe UI" panose="020B0502040204020203" pitchFamily="34" charset="0"/>
-              </a:rPr>
-              <a:t>MOTIVADORES</a:t>
-            </a:r>
-          </a:p>
-        </p:txBody>
-      </p:sp>
-      <p:sp>
-        <p:nvSpPr>
-          <p:cNvPr id="12" name="TextBox 5">
-            <a:extLst>
-              <a:ext uri="{FF2B5EF4-FFF2-40B4-BE49-F238E27FC236}">
-                <a16:creationId xmlns:a16="http://schemas.microsoft.com/office/drawing/2014/main" id="{5851FDBC-3A64-4F13-A36E-8750DCFCA6B6}"/>
-              </a:ext>
-            </a:extLst>
-          </p:cNvPr>
-          <p:cNvSpPr txBox="1"/>
-          <p:nvPr/>
-        </p:nvSpPr>
-        <p:spPr>
-          <a:xfrm>
-            <a:off x="950433" y="1764146"/>
-            <a:ext cx="4749768" cy="923330"/>
-          </a:xfrm>
-          <a:prstGeom prst="rect">
-            <a:avLst/>
-          </a:prstGeom>
-          <a:noFill/>
-        </p:spPr>
-        <p:txBody>
-          <a:bodyPr wrap="square" lIns="0" tIns="0" rIns="0" bIns="0" rtlCol="0">
-            <a:spAutoFit/>
-          </a:bodyPr>
-          <a:lstStyle/>
-          <a:p>
-            <a:pPr marL="342900" indent="-342900" algn="just">
-              <a:buFont typeface="Wingdings" panose="05000000000000000000" pitchFamily="2" charset="2"/>
-              <a:buChar char="ü"/>
-            </a:pPr>
-            <a:r>
-              <a:rPr lang="pt-BR" sz="2000" dirty="0">
-                <a:solidFill>
-                  <a:srgbClr val="123274"/>
-                </a:solidFill>
-                <a:latin typeface="Segoe UI" panose="020B0502040204020203" pitchFamily="34" charset="0"/>
-                <a:cs typeface="Segoe UI" panose="020B0502040204020203" pitchFamily="34" charset="0"/>
-              </a:rPr>
-              <a:t>Evolução de </a:t>
-            </a:r>
-            <a:r>
-              <a:rPr lang="pt-BR" sz="2000" b="1" dirty="0">
-                <a:solidFill>
-                  <a:srgbClr val="123274"/>
-                </a:solidFill>
-                <a:latin typeface="Segoe UI" panose="020B0502040204020203" pitchFamily="34" charset="0"/>
-                <a:cs typeface="Segoe UI" panose="020B0502040204020203" pitchFamily="34" charset="0"/>
-              </a:rPr>
-              <a:t>código</a:t>
-            </a:r>
-            <a:r>
-              <a:rPr lang="pt-BR" sz="2000" dirty="0">
-                <a:solidFill>
-                  <a:srgbClr val="123274"/>
-                </a:solidFill>
-                <a:latin typeface="Segoe UI" panose="020B0502040204020203" pitchFamily="34" charset="0"/>
-                <a:cs typeface="Segoe UI" panose="020B0502040204020203" pitchFamily="34" charset="0"/>
-              </a:rPr>
-              <a:t> e </a:t>
-            </a:r>
-            <a:r>
-              <a:rPr lang="pt-BR" sz="2000" b="1" dirty="0">
-                <a:solidFill>
-                  <a:srgbClr val="123274"/>
-                </a:solidFill>
-                <a:latin typeface="Segoe UI" panose="020B0502040204020203" pitchFamily="34" charset="0"/>
-                <a:cs typeface="Segoe UI" panose="020B0502040204020203" pitchFamily="34" charset="0"/>
-              </a:rPr>
-              <a:t>design</a:t>
-            </a:r>
-            <a:r>
-              <a:rPr lang="pt-BR" sz="2000" dirty="0">
-                <a:solidFill>
-                  <a:srgbClr val="123274"/>
-                </a:solidFill>
-                <a:latin typeface="Segoe UI" panose="020B0502040204020203" pitchFamily="34" charset="0"/>
-                <a:cs typeface="Segoe UI" panose="020B0502040204020203" pitchFamily="34" charset="0"/>
-              </a:rPr>
-              <a:t> </a:t>
-            </a:r>
-            <a:r>
-              <a:rPr lang="pt-BR" sz="2000" u="sng" dirty="0">
-                <a:solidFill>
-                  <a:srgbClr val="123274"/>
-                </a:solidFill>
-                <a:latin typeface="Segoe UI" panose="020B0502040204020203" pitchFamily="34" charset="0"/>
-                <a:cs typeface="Segoe UI" panose="020B0502040204020203" pitchFamily="34" charset="0"/>
-              </a:rPr>
-              <a:t>sustentável</a:t>
-            </a:r>
-            <a:r>
-              <a:rPr lang="pt-BR" sz="2000" dirty="0">
-                <a:solidFill>
-                  <a:srgbClr val="123274"/>
-                </a:solidFill>
-                <a:latin typeface="Segoe UI" panose="020B0502040204020203" pitchFamily="34" charset="0"/>
-                <a:cs typeface="Segoe UI" panose="020B0502040204020203" pitchFamily="34" charset="0"/>
-              </a:rPr>
-              <a:t> e </a:t>
-            </a:r>
-            <a:r>
-              <a:rPr lang="pt-BR" sz="2000" u="sng" dirty="0">
-                <a:solidFill>
-                  <a:srgbClr val="123274"/>
-                </a:solidFill>
-                <a:latin typeface="Segoe UI" panose="020B0502040204020203" pitchFamily="34" charset="0"/>
-                <a:cs typeface="Segoe UI" panose="020B0502040204020203" pitchFamily="34" charset="0"/>
-              </a:rPr>
-              <a:t>automatizada</a:t>
-            </a:r>
-            <a:r>
-              <a:rPr lang="pt-BR" sz="2000" dirty="0">
-                <a:solidFill>
-                  <a:srgbClr val="123274"/>
-                </a:solidFill>
-                <a:latin typeface="Segoe UI" panose="020B0502040204020203" pitchFamily="34" charset="0"/>
-                <a:cs typeface="Segoe UI" panose="020B0502040204020203" pitchFamily="34" charset="0"/>
-              </a:rPr>
-              <a:t> baseada em </a:t>
-            </a:r>
-            <a:r>
-              <a:rPr lang="pt-BR" sz="2000" b="1" u="sng" dirty="0">
-                <a:solidFill>
-                  <a:srgbClr val="123274"/>
-                </a:solidFill>
-                <a:latin typeface="Segoe UI" panose="020B0502040204020203" pitchFamily="34" charset="0"/>
-                <a:cs typeface="Segoe UI" panose="020B0502040204020203" pitchFamily="34" charset="0"/>
-              </a:rPr>
-              <a:t>testes</a:t>
-            </a:r>
-            <a:r>
-              <a:rPr lang="pt-BR" sz="2000" dirty="0">
-                <a:solidFill>
-                  <a:srgbClr val="123274"/>
-                </a:solidFill>
-                <a:latin typeface="Segoe UI" panose="020B0502040204020203" pitchFamily="34" charset="0"/>
-                <a:cs typeface="Segoe UI" panose="020B0502040204020203" pitchFamily="34" charset="0"/>
-              </a:rPr>
-              <a:t>.</a:t>
-            </a:r>
-          </a:p>
-        </p:txBody>
-      </p:sp>
-      <p:pic>
-        <p:nvPicPr>
-          <p:cNvPr id="15" name="Picture 14" descr="A screenshot of a cell phone&#10;&#10;Description automatically generated">
-            <a:extLst>
-              <a:ext uri="{FF2B5EF4-FFF2-40B4-BE49-F238E27FC236}">
-                <a16:creationId xmlns:a16="http://schemas.microsoft.com/office/drawing/2014/main" id="{052A170B-5E8E-4DF5-8B0D-11D31B0CA417}"/>
-              </a:ext>
-            </a:extLst>
-          </p:cNvPr>
-          <p:cNvPicPr>
-            <a:picLocks noChangeAspect="1"/>
-          </p:cNvPicPr>
-          <p:nvPr/>
-        </p:nvPicPr>
-        <p:blipFill rotWithShape="1">
-          <a:blip r:embed="rId2">
-            <a:extLst>
-              <a:ext uri="{28A0092B-C50C-407E-A947-70E740481C1C}">
-                <a14:useLocalDpi xmlns:a14="http://schemas.microsoft.com/office/drawing/2010/main" val="0"/>
-              </a:ext>
-            </a:extLst>
-          </a:blip>
-          <a:srcRect l="3422" t="15618" r="3095" b="5779"/>
-          <a:stretch/>
-        </p:blipFill>
-        <p:spPr>
-          <a:xfrm>
-            <a:off x="6096000" y="807609"/>
-            <a:ext cx="4749768" cy="2836404"/>
-          </a:xfrm>
-          <a:prstGeom prst="rect">
-            <a:avLst/>
-          </a:prstGeom>
-          <a:ln>
-            <a:noFill/>
-          </a:ln>
-          <a:effectLst>
-            <a:outerShdw blurRad="292100" dist="139700" dir="2700000" algn="tl" rotWithShape="0">
-              <a:srgbClr val="333333">
-                <a:alpha val="65000"/>
-              </a:srgbClr>
-            </a:outerShdw>
-          </a:effectLst>
-        </p:spPr>
-      </p:pic>
-      <p:pic>
-        <p:nvPicPr>
-          <p:cNvPr id="7" name="Picture 6" descr="A picture containing toy&#10;&#10;Description automatically generated">
-            <a:extLst>
-              <a:ext uri="{FF2B5EF4-FFF2-40B4-BE49-F238E27FC236}">
-                <a16:creationId xmlns:a16="http://schemas.microsoft.com/office/drawing/2014/main" id="{894F1E9D-9787-48BE-9DF9-A81173AB662B}"/>
-              </a:ext>
-            </a:extLst>
-          </p:cNvPr>
-          <p:cNvPicPr>
-            <a:picLocks noChangeAspect="1"/>
-          </p:cNvPicPr>
-          <p:nvPr/>
-        </p:nvPicPr>
-        <p:blipFill>
-          <a:blip r:embed="rId3" cstate="print">
-            <a:extLst>
-              <a:ext uri="{28A0092B-C50C-407E-A947-70E740481C1C}">
-                <a14:useLocalDpi xmlns:a14="http://schemas.microsoft.com/office/drawing/2010/main" val="0"/>
-              </a:ext>
-            </a:extLst>
-          </a:blip>
-          <a:stretch>
-            <a:fillRect/>
-          </a:stretch>
-        </p:blipFill>
-        <p:spPr>
-          <a:xfrm>
-            <a:off x="1597125" y="3640743"/>
-            <a:ext cx="3456384" cy="2592288"/>
-          </a:xfrm>
-          <a:prstGeom prst="rect">
-            <a:avLst/>
-          </a:prstGeom>
-          <a:ln>
-            <a:noFill/>
-          </a:ln>
-          <a:effectLst>
-            <a:outerShdw blurRad="190500" algn="tl" rotWithShape="0">
-              <a:srgbClr val="000000">
-                <a:alpha val="70000"/>
-              </a:srgbClr>
-            </a:outerShdw>
-          </a:effectLst>
-        </p:spPr>
-      </p:pic>
-      <p:sp>
-        <p:nvSpPr>
-          <p:cNvPr id="8" name="TextBox 5">
-            <a:extLst>
-              <a:ext uri="{FF2B5EF4-FFF2-40B4-BE49-F238E27FC236}">
-                <a16:creationId xmlns:a16="http://schemas.microsoft.com/office/drawing/2014/main" id="{658069ED-6521-4721-8854-E7664CD7494E}"/>
-              </a:ext>
-            </a:extLst>
-          </p:cNvPr>
-          <p:cNvSpPr txBox="1"/>
-          <p:nvPr/>
-        </p:nvSpPr>
-        <p:spPr>
-          <a:xfrm>
-            <a:off x="6096000" y="4629110"/>
-            <a:ext cx="4749768" cy="615553"/>
-          </a:xfrm>
-          <a:prstGeom prst="rect">
-            <a:avLst/>
-          </a:prstGeom>
-          <a:noFill/>
-        </p:spPr>
-        <p:txBody>
-          <a:bodyPr wrap="square" lIns="0" tIns="0" rIns="0" bIns="0" rtlCol="0">
-            <a:spAutoFit/>
-          </a:bodyPr>
-          <a:lstStyle/>
-          <a:p>
-            <a:pPr marL="342900" indent="-342900" algn="just">
-              <a:buFont typeface="Wingdings" panose="05000000000000000000" pitchFamily="2" charset="2"/>
-              <a:buChar char="ü"/>
-            </a:pPr>
-            <a:r>
-              <a:rPr lang="pt-BR" sz="2000" dirty="0">
-                <a:solidFill>
-                  <a:srgbClr val="123274"/>
-                </a:solidFill>
-                <a:latin typeface="Segoe UI" panose="020B0502040204020203" pitchFamily="34" charset="0"/>
-                <a:cs typeface="Segoe UI" panose="020B0502040204020203" pitchFamily="34" charset="0"/>
-              </a:rPr>
-              <a:t>Diminuir as complexidades </a:t>
-            </a:r>
-            <a:r>
-              <a:rPr lang="pt-BR" sz="2000" dirty="0" err="1">
-                <a:solidFill>
-                  <a:srgbClr val="123274"/>
-                </a:solidFill>
-                <a:latin typeface="Segoe UI" panose="020B0502040204020203" pitchFamily="34" charset="0"/>
-                <a:cs typeface="Segoe UI" panose="020B0502040204020203" pitchFamily="34" charset="0"/>
-              </a:rPr>
-              <a:t>ciclomática</a:t>
-            </a:r>
-            <a:r>
-              <a:rPr lang="pt-BR" sz="2000" dirty="0">
-                <a:solidFill>
-                  <a:srgbClr val="123274"/>
-                </a:solidFill>
-                <a:latin typeface="Segoe UI" panose="020B0502040204020203" pitchFamily="34" charset="0"/>
-                <a:cs typeface="Segoe UI" panose="020B0502040204020203" pitchFamily="34" charset="0"/>
-              </a:rPr>
-              <a:t> e cognitiva e eliminar </a:t>
-            </a:r>
-            <a:r>
-              <a:rPr lang="pt-BR" sz="2000" dirty="0" err="1">
-                <a:solidFill>
-                  <a:srgbClr val="123274"/>
-                </a:solidFill>
-                <a:latin typeface="Segoe UI" panose="020B0502040204020203" pitchFamily="34" charset="0"/>
-                <a:cs typeface="Segoe UI" panose="020B0502040204020203" pitchFamily="34" charset="0"/>
-              </a:rPr>
-              <a:t>dirty</a:t>
-            </a:r>
-            <a:r>
-              <a:rPr lang="pt-BR" sz="2000" dirty="0">
-                <a:solidFill>
-                  <a:srgbClr val="123274"/>
-                </a:solidFill>
-                <a:latin typeface="Segoe UI" panose="020B0502040204020203" pitchFamily="34" charset="0"/>
-                <a:cs typeface="Segoe UI" panose="020B0502040204020203" pitchFamily="34" charset="0"/>
-              </a:rPr>
-              <a:t> </a:t>
-            </a:r>
-            <a:r>
-              <a:rPr lang="pt-BR" sz="2000" dirty="0" err="1">
-                <a:solidFill>
-                  <a:srgbClr val="123274"/>
-                </a:solidFill>
-                <a:latin typeface="Segoe UI" panose="020B0502040204020203" pitchFamily="34" charset="0"/>
-                <a:cs typeface="Segoe UI" panose="020B0502040204020203" pitchFamily="34" charset="0"/>
-              </a:rPr>
-              <a:t>code</a:t>
-            </a:r>
-            <a:r>
-              <a:rPr lang="pt-BR" sz="2000" dirty="0">
-                <a:solidFill>
-                  <a:srgbClr val="123274"/>
-                </a:solidFill>
-                <a:latin typeface="Segoe UI" panose="020B0502040204020203" pitchFamily="34" charset="0"/>
-                <a:cs typeface="Segoe UI" panose="020B0502040204020203" pitchFamily="34" charset="0"/>
-              </a:rPr>
-              <a:t>.</a:t>
-            </a:r>
-          </a:p>
-        </p:txBody>
-      </p:sp>
-    </p:spTree>
-    <p:extLst>
-      <p:ext uri="{BB962C8B-B14F-4D97-AF65-F5344CB8AC3E}">
-        <p14:creationId xmlns:p14="http://schemas.microsoft.com/office/powerpoint/2010/main" val="4101763050"/>
       </p:ext>
     </p:extLst>
   </p:cSld>
@@ -7070,6 +7859,487 @@
       </p:grpSpPr>
       <p:sp>
         <p:nvSpPr>
+          <p:cNvPr id="6" name="Rectangle 13"/>
+          <p:cNvSpPr/>
+          <p:nvPr/>
+        </p:nvSpPr>
+        <p:spPr>
+          <a:xfrm>
+            <a:off x="335360" y="3077189"/>
+            <a:ext cx="9361040" cy="639278"/>
+          </a:xfrm>
+          <a:prstGeom prst="rect">
+            <a:avLst/>
+          </a:prstGeom>
+        </p:spPr>
+        <p:txBody>
+          <a:bodyPr wrap="square" anchor="ctr">
+            <a:spAutoFit/>
+          </a:bodyPr>
+          <a:lstStyle/>
+          <a:p>
+            <a:pPr lvl="0">
+              <a:lnSpc>
+                <a:spcPts val="4600"/>
+              </a:lnSpc>
+            </a:pPr>
+            <a:r>
+              <a:rPr lang="en-US" sz="3600" dirty="0" err="1">
+                <a:solidFill>
+                  <a:srgbClr val="FFFFFF"/>
+                </a:solidFill>
+                <a:latin typeface="Segoe UI" panose="020B0502040204020203" pitchFamily="34" charset="0"/>
+                <a:cs typeface="Segoe UI" panose="020B0502040204020203" pitchFamily="34" charset="0"/>
+              </a:rPr>
+              <a:t>Motivadores</a:t>
+            </a:r>
+            <a:r>
+              <a:rPr lang="en-US" sz="3600" dirty="0">
+                <a:solidFill>
+                  <a:srgbClr val="FFFFFF"/>
+                </a:solidFill>
+                <a:latin typeface="Segoe UI" panose="020B0502040204020203" pitchFamily="34" charset="0"/>
+                <a:cs typeface="Segoe UI" panose="020B0502040204020203" pitchFamily="34" charset="0"/>
+              </a:rPr>
+              <a:t> B3</a:t>
+            </a:r>
+          </a:p>
+        </p:txBody>
+      </p:sp>
+    </p:spTree>
+    <p:extLst>
+      <p:ext uri="{BB962C8B-B14F-4D97-AF65-F5344CB8AC3E}">
+        <p14:creationId xmlns:p14="http://schemas.microsoft.com/office/powerpoint/2010/main" val="2940308037"/>
+      </p:ext>
+    </p:extLst>
+  </p:cSld>
+  <p:clrMapOvr>
+    <a:masterClrMapping/>
+  </p:clrMapOvr>
+  <p:transition>
+    <p:fade thruBlk="1"/>
+  </p:transition>
+</p:sld>
+</file>
+
+<file path=ppt/slides/slide7.xml><?xml version="1.0" encoding="utf-8"?>
+<p:sld xmlns:a="http://schemas.openxmlformats.org/drawingml/2006/main" xmlns:r="http://schemas.openxmlformats.org/officeDocument/2006/relationships" xmlns:p="http://schemas.openxmlformats.org/presentationml/2006/main">
+  <p:cSld>
+    <p:spTree>
+      <p:nvGrpSpPr>
+        <p:cNvPr id="1" name=""/>
+        <p:cNvGrpSpPr/>
+        <p:nvPr/>
+      </p:nvGrpSpPr>
+      <p:grpSpPr>
+        <a:xfrm>
+          <a:off x="0" y="0"/>
+          <a:ext cx="0" cy="0"/>
+          <a:chOff x="0" y="0"/>
+          <a:chExt cx="0" cy="0"/>
+        </a:xfrm>
+      </p:grpSpPr>
+      <p:sp>
+        <p:nvSpPr>
+          <p:cNvPr id="2" name="Título 1"/>
+          <p:cNvSpPr>
+            <a:spLocks noGrp="1"/>
+          </p:cNvSpPr>
+          <p:nvPr>
+            <p:ph type="title"/>
+          </p:nvPr>
+        </p:nvSpPr>
+        <p:spPr/>
+        <p:txBody>
+          <a:bodyPr/>
+          <a:lstStyle/>
+          <a:p>
+            <a:r>
+              <a:rPr lang="pt-BR" dirty="0">
+                <a:latin typeface="Segoe UI" panose="020B0502040204020203" pitchFamily="34" charset="0"/>
+                <a:cs typeface="Segoe UI" panose="020B0502040204020203" pitchFamily="34" charset="0"/>
+              </a:rPr>
+              <a:t>MOTIVADORES</a:t>
+            </a:r>
+          </a:p>
+        </p:txBody>
+      </p:sp>
+      <p:sp>
+        <p:nvSpPr>
+          <p:cNvPr id="12" name="TextBox 5">
+            <a:extLst>
+              <a:ext uri="{FF2B5EF4-FFF2-40B4-BE49-F238E27FC236}">
+                <a16:creationId xmlns:a16="http://schemas.microsoft.com/office/drawing/2014/main" id="{5851FDBC-3A64-4F13-A36E-8750DCFCA6B6}"/>
+              </a:ext>
+            </a:extLst>
+          </p:cNvPr>
+          <p:cNvSpPr txBox="1"/>
+          <p:nvPr/>
+        </p:nvSpPr>
+        <p:spPr>
+          <a:xfrm>
+            <a:off x="950433" y="1764146"/>
+            <a:ext cx="4749768" cy="923330"/>
+          </a:xfrm>
+          <a:prstGeom prst="rect">
+            <a:avLst/>
+          </a:prstGeom>
+          <a:noFill/>
+        </p:spPr>
+        <p:txBody>
+          <a:bodyPr wrap="square" lIns="0" tIns="0" rIns="0" bIns="0" rtlCol="0">
+            <a:spAutoFit/>
+          </a:bodyPr>
+          <a:lstStyle/>
+          <a:p>
+            <a:pPr marL="342900" indent="-342900" algn="just">
+              <a:buFont typeface="Wingdings" panose="05000000000000000000" pitchFamily="2" charset="2"/>
+              <a:buChar char="ü"/>
+            </a:pPr>
+            <a:r>
+              <a:rPr lang="pt-BR" sz="2000" dirty="0">
+                <a:solidFill>
+                  <a:srgbClr val="123274"/>
+                </a:solidFill>
+                <a:latin typeface="Segoe UI" panose="020B0502040204020203" pitchFamily="34" charset="0"/>
+                <a:cs typeface="Segoe UI" panose="020B0502040204020203" pitchFamily="34" charset="0"/>
+              </a:rPr>
+              <a:t>Evolução de </a:t>
+            </a:r>
+            <a:r>
+              <a:rPr lang="pt-BR" sz="2000" b="1" dirty="0">
+                <a:solidFill>
+                  <a:srgbClr val="123274"/>
+                </a:solidFill>
+                <a:latin typeface="Segoe UI" panose="020B0502040204020203" pitchFamily="34" charset="0"/>
+                <a:cs typeface="Segoe UI" panose="020B0502040204020203" pitchFamily="34" charset="0"/>
+              </a:rPr>
+              <a:t>código</a:t>
+            </a:r>
+            <a:r>
+              <a:rPr lang="pt-BR" sz="2000" dirty="0">
+                <a:solidFill>
+                  <a:srgbClr val="123274"/>
+                </a:solidFill>
+                <a:latin typeface="Segoe UI" panose="020B0502040204020203" pitchFamily="34" charset="0"/>
+                <a:cs typeface="Segoe UI" panose="020B0502040204020203" pitchFamily="34" charset="0"/>
+              </a:rPr>
+              <a:t> e </a:t>
+            </a:r>
+            <a:r>
+              <a:rPr lang="pt-BR" sz="2000" b="1" dirty="0">
+                <a:solidFill>
+                  <a:srgbClr val="123274"/>
+                </a:solidFill>
+                <a:latin typeface="Segoe UI" panose="020B0502040204020203" pitchFamily="34" charset="0"/>
+                <a:cs typeface="Segoe UI" panose="020B0502040204020203" pitchFamily="34" charset="0"/>
+              </a:rPr>
+              <a:t>design</a:t>
+            </a:r>
+            <a:r>
+              <a:rPr lang="pt-BR" sz="2000" dirty="0">
+                <a:solidFill>
+                  <a:srgbClr val="123274"/>
+                </a:solidFill>
+                <a:latin typeface="Segoe UI" panose="020B0502040204020203" pitchFamily="34" charset="0"/>
+                <a:cs typeface="Segoe UI" panose="020B0502040204020203" pitchFamily="34" charset="0"/>
+              </a:rPr>
+              <a:t> </a:t>
+            </a:r>
+            <a:r>
+              <a:rPr lang="pt-BR" sz="2000" u="sng" dirty="0">
+                <a:solidFill>
+                  <a:srgbClr val="123274"/>
+                </a:solidFill>
+                <a:latin typeface="Segoe UI" panose="020B0502040204020203" pitchFamily="34" charset="0"/>
+                <a:cs typeface="Segoe UI" panose="020B0502040204020203" pitchFamily="34" charset="0"/>
+              </a:rPr>
+              <a:t>sustentável</a:t>
+            </a:r>
+            <a:r>
+              <a:rPr lang="pt-BR" sz="2000" dirty="0">
+                <a:solidFill>
+                  <a:srgbClr val="123274"/>
+                </a:solidFill>
+                <a:latin typeface="Segoe UI" panose="020B0502040204020203" pitchFamily="34" charset="0"/>
+                <a:cs typeface="Segoe UI" panose="020B0502040204020203" pitchFamily="34" charset="0"/>
+              </a:rPr>
+              <a:t> e </a:t>
+            </a:r>
+            <a:r>
+              <a:rPr lang="pt-BR" sz="2000" u="sng" dirty="0">
+                <a:solidFill>
+                  <a:srgbClr val="123274"/>
+                </a:solidFill>
+                <a:latin typeface="Segoe UI" panose="020B0502040204020203" pitchFamily="34" charset="0"/>
+                <a:cs typeface="Segoe UI" panose="020B0502040204020203" pitchFamily="34" charset="0"/>
+              </a:rPr>
+              <a:t>automatizada</a:t>
+            </a:r>
+            <a:r>
+              <a:rPr lang="pt-BR" sz="2000" dirty="0">
+                <a:solidFill>
+                  <a:srgbClr val="123274"/>
+                </a:solidFill>
+                <a:latin typeface="Segoe UI" panose="020B0502040204020203" pitchFamily="34" charset="0"/>
+                <a:cs typeface="Segoe UI" panose="020B0502040204020203" pitchFamily="34" charset="0"/>
+              </a:rPr>
+              <a:t> baseada em </a:t>
+            </a:r>
+            <a:r>
+              <a:rPr lang="pt-BR" sz="2000" b="1" u="sng" dirty="0">
+                <a:solidFill>
+                  <a:srgbClr val="123274"/>
+                </a:solidFill>
+                <a:latin typeface="Segoe UI" panose="020B0502040204020203" pitchFamily="34" charset="0"/>
+                <a:cs typeface="Segoe UI" panose="020B0502040204020203" pitchFamily="34" charset="0"/>
+              </a:rPr>
+              <a:t>testes</a:t>
+            </a:r>
+            <a:r>
+              <a:rPr lang="pt-BR" sz="2000" dirty="0">
+                <a:solidFill>
+                  <a:srgbClr val="123274"/>
+                </a:solidFill>
+                <a:latin typeface="Segoe UI" panose="020B0502040204020203" pitchFamily="34" charset="0"/>
+                <a:cs typeface="Segoe UI" panose="020B0502040204020203" pitchFamily="34" charset="0"/>
+              </a:rPr>
+              <a:t>.</a:t>
+            </a:r>
+          </a:p>
+        </p:txBody>
+      </p:sp>
+      <p:pic>
+        <p:nvPicPr>
+          <p:cNvPr id="15" name="Picture 14" descr="A screenshot of a cell phone&#10;&#10;Description automatically generated">
+            <a:extLst>
+              <a:ext uri="{FF2B5EF4-FFF2-40B4-BE49-F238E27FC236}">
+                <a16:creationId xmlns:a16="http://schemas.microsoft.com/office/drawing/2014/main" id="{052A170B-5E8E-4DF5-8B0D-11D31B0CA417}"/>
+              </a:ext>
+            </a:extLst>
+          </p:cNvPr>
+          <p:cNvPicPr>
+            <a:picLocks noChangeAspect="1"/>
+          </p:cNvPicPr>
+          <p:nvPr/>
+        </p:nvPicPr>
+        <p:blipFill rotWithShape="1">
+          <a:blip r:embed="rId2">
+            <a:extLst>
+              <a:ext uri="{28A0092B-C50C-407E-A947-70E740481C1C}">
+                <a14:useLocalDpi xmlns:a14="http://schemas.microsoft.com/office/drawing/2010/main" val="0"/>
+              </a:ext>
+            </a:extLst>
+          </a:blip>
+          <a:srcRect l="3422" t="15618" r="3095" b="5779"/>
+          <a:stretch/>
+        </p:blipFill>
+        <p:spPr>
+          <a:xfrm>
+            <a:off x="6096000" y="807609"/>
+            <a:ext cx="4749768" cy="2836404"/>
+          </a:xfrm>
+          <a:prstGeom prst="rect">
+            <a:avLst/>
+          </a:prstGeom>
+          <a:ln>
+            <a:noFill/>
+          </a:ln>
+          <a:effectLst>
+            <a:outerShdw blurRad="292100" dist="139700" dir="2700000" algn="tl" rotWithShape="0">
+              <a:srgbClr val="333333">
+                <a:alpha val="65000"/>
+              </a:srgbClr>
+            </a:outerShdw>
+          </a:effectLst>
+        </p:spPr>
+      </p:pic>
+      <p:pic>
+        <p:nvPicPr>
+          <p:cNvPr id="7" name="Picture 6" descr="A picture containing toy&#10;&#10;Description automatically generated">
+            <a:extLst>
+              <a:ext uri="{FF2B5EF4-FFF2-40B4-BE49-F238E27FC236}">
+                <a16:creationId xmlns:a16="http://schemas.microsoft.com/office/drawing/2014/main" id="{894F1E9D-9787-48BE-9DF9-A81173AB662B}"/>
+              </a:ext>
+            </a:extLst>
+          </p:cNvPr>
+          <p:cNvPicPr>
+            <a:picLocks noChangeAspect="1"/>
+          </p:cNvPicPr>
+          <p:nvPr/>
+        </p:nvPicPr>
+        <p:blipFill>
+          <a:blip r:embed="rId3" cstate="print">
+            <a:extLst>
+              <a:ext uri="{28A0092B-C50C-407E-A947-70E740481C1C}">
+                <a14:useLocalDpi xmlns:a14="http://schemas.microsoft.com/office/drawing/2010/main" val="0"/>
+              </a:ext>
+            </a:extLst>
+          </a:blip>
+          <a:stretch>
+            <a:fillRect/>
+          </a:stretch>
+        </p:blipFill>
+        <p:spPr>
+          <a:xfrm>
+            <a:off x="1597125" y="3640743"/>
+            <a:ext cx="3456384" cy="2592288"/>
+          </a:xfrm>
+          <a:prstGeom prst="rect">
+            <a:avLst/>
+          </a:prstGeom>
+          <a:ln>
+            <a:noFill/>
+          </a:ln>
+          <a:effectLst>
+            <a:outerShdw blurRad="190500" algn="tl" rotWithShape="0">
+              <a:srgbClr val="000000">
+                <a:alpha val="70000"/>
+              </a:srgbClr>
+            </a:outerShdw>
+          </a:effectLst>
+        </p:spPr>
+      </p:pic>
+      <p:sp>
+        <p:nvSpPr>
+          <p:cNvPr id="8" name="TextBox 5">
+            <a:extLst>
+              <a:ext uri="{FF2B5EF4-FFF2-40B4-BE49-F238E27FC236}">
+                <a16:creationId xmlns:a16="http://schemas.microsoft.com/office/drawing/2014/main" id="{658069ED-6521-4721-8854-E7664CD7494E}"/>
+              </a:ext>
+            </a:extLst>
+          </p:cNvPr>
+          <p:cNvSpPr txBox="1"/>
+          <p:nvPr/>
+        </p:nvSpPr>
+        <p:spPr>
+          <a:xfrm>
+            <a:off x="6096000" y="4629110"/>
+            <a:ext cx="4749768" cy="615553"/>
+          </a:xfrm>
+          <a:prstGeom prst="rect">
+            <a:avLst/>
+          </a:prstGeom>
+          <a:noFill/>
+        </p:spPr>
+        <p:txBody>
+          <a:bodyPr wrap="square" lIns="0" tIns="0" rIns="0" bIns="0" rtlCol="0">
+            <a:spAutoFit/>
+          </a:bodyPr>
+          <a:lstStyle/>
+          <a:p>
+            <a:pPr marL="342900" indent="-342900" algn="just">
+              <a:buFont typeface="Wingdings" panose="05000000000000000000" pitchFamily="2" charset="2"/>
+              <a:buChar char="ü"/>
+            </a:pPr>
+            <a:r>
+              <a:rPr lang="pt-BR" sz="2000" dirty="0">
+                <a:solidFill>
+                  <a:srgbClr val="123274"/>
+                </a:solidFill>
+                <a:latin typeface="Segoe UI" panose="020B0502040204020203" pitchFamily="34" charset="0"/>
+                <a:cs typeface="Segoe UI" panose="020B0502040204020203" pitchFamily="34" charset="0"/>
+              </a:rPr>
+              <a:t>Diminuir as complexidades </a:t>
+            </a:r>
+            <a:r>
+              <a:rPr lang="pt-BR" sz="2000" dirty="0" err="1">
+                <a:solidFill>
+                  <a:srgbClr val="123274"/>
+                </a:solidFill>
+                <a:latin typeface="Segoe UI" panose="020B0502040204020203" pitchFamily="34" charset="0"/>
+                <a:cs typeface="Segoe UI" panose="020B0502040204020203" pitchFamily="34" charset="0"/>
+              </a:rPr>
+              <a:t>ciclomática</a:t>
+            </a:r>
+            <a:r>
+              <a:rPr lang="pt-BR" sz="2000" dirty="0">
+                <a:solidFill>
+                  <a:srgbClr val="123274"/>
+                </a:solidFill>
+                <a:latin typeface="Segoe UI" panose="020B0502040204020203" pitchFamily="34" charset="0"/>
+                <a:cs typeface="Segoe UI" panose="020B0502040204020203" pitchFamily="34" charset="0"/>
+              </a:rPr>
+              <a:t> e cognitiva e eliminar </a:t>
+            </a:r>
+            <a:r>
+              <a:rPr lang="pt-BR" sz="2000" dirty="0" err="1">
+                <a:solidFill>
+                  <a:srgbClr val="123274"/>
+                </a:solidFill>
+                <a:latin typeface="Segoe UI" panose="020B0502040204020203" pitchFamily="34" charset="0"/>
+                <a:cs typeface="Segoe UI" panose="020B0502040204020203" pitchFamily="34" charset="0"/>
+              </a:rPr>
+              <a:t>dirty</a:t>
+            </a:r>
+            <a:r>
+              <a:rPr lang="pt-BR" sz="2000" dirty="0">
+                <a:solidFill>
+                  <a:srgbClr val="123274"/>
+                </a:solidFill>
+                <a:latin typeface="Segoe UI" panose="020B0502040204020203" pitchFamily="34" charset="0"/>
+                <a:cs typeface="Segoe UI" panose="020B0502040204020203" pitchFamily="34" charset="0"/>
+              </a:rPr>
+              <a:t> </a:t>
+            </a:r>
+            <a:r>
+              <a:rPr lang="pt-BR" sz="2000" dirty="0" err="1">
+                <a:solidFill>
+                  <a:srgbClr val="123274"/>
+                </a:solidFill>
+                <a:latin typeface="Segoe UI" panose="020B0502040204020203" pitchFamily="34" charset="0"/>
+                <a:cs typeface="Segoe UI" panose="020B0502040204020203" pitchFamily="34" charset="0"/>
+              </a:rPr>
+              <a:t>code</a:t>
+            </a:r>
+            <a:r>
+              <a:rPr lang="pt-BR" sz="2000" dirty="0">
+                <a:solidFill>
+                  <a:srgbClr val="123274"/>
+                </a:solidFill>
+                <a:latin typeface="Segoe UI" panose="020B0502040204020203" pitchFamily="34" charset="0"/>
+                <a:cs typeface="Segoe UI" panose="020B0502040204020203" pitchFamily="34" charset="0"/>
+              </a:rPr>
+              <a:t>.</a:t>
+            </a:r>
+          </a:p>
+        </p:txBody>
+      </p:sp>
+    </p:spTree>
+    <p:extLst>
+      <p:ext uri="{BB962C8B-B14F-4D97-AF65-F5344CB8AC3E}">
+        <p14:creationId xmlns:p14="http://schemas.microsoft.com/office/powerpoint/2010/main" val="4101763050"/>
+      </p:ext>
+    </p:extLst>
+  </p:cSld>
+  <p:clrMapOvr>
+    <a:masterClrMapping/>
+  </p:clrMapOvr>
+  <p:transition>
+    <p:fade/>
+  </p:transition>
+</p:sld>
+</file>
+
+<file path=ppt/slides/slide8.xml><?xml version="1.0" encoding="utf-8"?>
+<p:sld xmlns:a="http://schemas.openxmlformats.org/drawingml/2006/main" xmlns:r="http://schemas.openxmlformats.org/officeDocument/2006/relationships" xmlns:p="http://schemas.openxmlformats.org/presentationml/2006/main">
+  <p:cSld>
+    <p:spTree>
+      <p:nvGrpSpPr>
+        <p:cNvPr id="1" name=""/>
+        <p:cNvGrpSpPr/>
+        <p:nvPr/>
+      </p:nvGrpSpPr>
+      <p:grpSpPr>
+        <a:xfrm>
+          <a:off x="0" y="0"/>
+          <a:ext cx="0" cy="0"/>
+          <a:chOff x="0" y="0"/>
+          <a:chExt cx="0" cy="0"/>
+        </a:xfrm>
+      </p:grpSpPr>
+      <p:sp>
+        <p:nvSpPr>
           <p:cNvPr id="2" name="Título 1"/>
           <p:cNvSpPr>
             <a:spLocks noGrp="1"/>
@@ -7375,7 +8645,7 @@
 </p:sld>
 </file>
 
-<file path=ppt/slides/slide7.xml><?xml version="1.0" encoding="utf-8"?>
+<file path=ppt/slides/slide9.xml><?xml version="1.0" encoding="utf-8"?>
 <p:sld xmlns:a="http://schemas.openxmlformats.org/drawingml/2006/main" xmlns:r="http://schemas.openxmlformats.org/officeDocument/2006/relationships" xmlns:p="http://schemas.openxmlformats.org/presentationml/2006/main">
   <p:cSld>
     <p:spTree>
@@ -7411,7 +8681,7 @@
         <p:spPr>
           <a:xfrm>
             <a:off x="407988" y="2204864"/>
-            <a:ext cx="9000380" cy="1944216"/>
+            <a:ext cx="9000380" cy="1800200"/>
           </a:xfrm>
         </p:spPr>
         <p:txBody>
@@ -7459,15 +8729,9 @@
                 <a:latin typeface="Segoe UI" panose="020B0502040204020203" pitchFamily="34" charset="0"/>
                 <a:cs typeface="Segoe UI" panose="020B0502040204020203" pitchFamily="34" charset="0"/>
               </a:rPr>
-              <a:t>prestador-paulo.kolbe@b3.com.br/</a:t>
+              <a:t>lace@b3.com.br</a:t>
             </a:r>
             <a:br>
-              <a:rPr lang="pt-BR" sz="2000" dirty="0">
-                <a:latin typeface="Segoe UI" panose="020B0502040204020203" pitchFamily="34" charset="0"/>
-                <a:cs typeface="Segoe UI" panose="020B0502040204020203" pitchFamily="34" charset="0"/>
-              </a:rPr>
-            </a:br>
-            <a:r>
               <a:rPr lang="pt-BR" sz="2000" dirty="0">
                 <a:solidFill>
                   <a:schemeClr val="accent1"/>
@@ -7475,8 +8739,14 @@
                 <a:latin typeface="Segoe UI" panose="020B0502040204020203" pitchFamily="34" charset="0"/>
                 <a:cs typeface="Segoe UI" panose="020B0502040204020203" pitchFamily="34" charset="0"/>
               </a:rPr>
-              <a:t>paulo.kolbe@gft.com</a:t>
-            </a:r>
+            </a:br>
+            <a:endParaRPr lang="pt-BR" sz="2000" dirty="0">
+              <a:solidFill>
+                <a:schemeClr val="accent1"/>
+              </a:solidFill>
+              <a:latin typeface="Segoe UI" panose="020B0502040204020203" pitchFamily="34" charset="0"/>
+              <a:cs typeface="Segoe UI" panose="020B0502040204020203" pitchFamily="34" charset="0"/>
+            </a:endParaRPr>
           </a:p>
         </p:txBody>
       </p:sp>
@@ -7542,7 +8812,7 @@
         </p:blipFill>
         <p:spPr>
           <a:xfrm>
-            <a:off x="839416" y="4470308"/>
+            <a:off x="767408" y="4005064"/>
             <a:ext cx="3096344" cy="1327005"/>
           </a:xfrm>
           <a:prstGeom prst="rect">
@@ -8467,15 +9737,6 @@
 </file>
 
 <file path=customXml/item1.xml><?xml version="1.0" encoding="utf-8"?>
-<p:properties xmlns:p="http://schemas.microsoft.com/office/2006/metadata/properties" xmlns:xsi="http://www.w3.org/2001/XMLSchema-instance" xmlns:pc="http://schemas.microsoft.com/office/infopath/2007/PartnerControls">
-  <documentManagement>
-    <PublishingExpirationDate xmlns="http://schemas.microsoft.com/sharepoint/v3" xsi:nil="true"/>
-    <PublishingStartDate xmlns="http://schemas.microsoft.com/sharepoint/v3" xsi:nil="true"/>
-  </documentManagement>
-</p:properties>
-</file>
-
-<file path=customXml/item2.xml><?xml version="1.0" encoding="utf-8"?>
 <?mso-contentType ?>
 <FormTemplates xmlns="http://schemas.microsoft.com/sharepoint/v3/contenttype/forms">
   <Display>DocumentLibraryForm</Display>
@@ -8484,7 +9745,7 @@
 </FormTemplates>
 </file>
 
-<file path=customXml/item3.xml><?xml version="1.0" encoding="utf-8"?>
+<file path=customXml/item2.xml><?xml version="1.0" encoding="utf-8"?>
 <ct:contentTypeSchema xmlns:ct="http://schemas.microsoft.com/office/2006/metadata/contentType" xmlns:ma="http://schemas.microsoft.com/office/2006/metadata/properties/metaAttributes" ct:_="" ma:_="" ma:contentTypeName="Documento" ma:contentTypeID="0x0101001996EFEF7D0459479C2B077F9CC506F4" ma:contentTypeVersion="10" ma:contentTypeDescription="Crie um novo documento." ma:contentTypeScope="" ma:versionID="43cd10b64f265b7dd32059be640333a9">
   <xsd:schema xmlns:xsd="http://www.w3.org/2001/XMLSchema" xmlns:xs="http://www.w3.org/2001/XMLSchema" xmlns:p="http://schemas.microsoft.com/office/2006/metadata/properties" xmlns:ns1="http://schemas.microsoft.com/sharepoint/v3" xmlns:ns2="80facd6c-f04a-426f-adbd-b3840a7840bd" xmlns:ns3="d33496c5-bd94-446e-a363-fca1fec0d15a" targetNamespace="http://schemas.microsoft.com/office/2006/metadata/properties" ma:root="true" ma:fieldsID="0d6b128c5ce9545d0d2912f9a975af95" ns1:_="" ns2:_="" ns3:_="">
     <xsd:import namespace="http://schemas.microsoft.com/sharepoint/v3"/>
@@ -8698,17 +9959,16 @@
 </ct:contentTypeSchema>
 </file>
 
-<file path=customXml/itemProps1.xml><?xml version="1.0" encoding="utf-8"?>
-<ds:datastoreItem xmlns:ds="http://schemas.openxmlformats.org/officeDocument/2006/customXml" ds:itemID="{BEF3FD83-2601-46A9-AA9B-655B326F1C5E}">
-  <ds:schemaRefs>
-    <ds:schemaRef ds:uri="http://schemas.microsoft.com/office/2006/metadata/properties"/>
-    <ds:schemaRef ds:uri="http://schemas.microsoft.com/office/infopath/2007/PartnerControls"/>
-    <ds:schemaRef ds:uri="http://schemas.microsoft.com/sharepoint/v3"/>
-  </ds:schemaRefs>
-</ds:datastoreItem>
+<file path=customXml/item3.xml><?xml version="1.0" encoding="utf-8"?>
+<p:properties xmlns:p="http://schemas.microsoft.com/office/2006/metadata/properties" xmlns:xsi="http://www.w3.org/2001/XMLSchema-instance" xmlns:pc="http://schemas.microsoft.com/office/infopath/2007/PartnerControls">
+  <documentManagement>
+    <PublishingExpirationDate xmlns="http://schemas.microsoft.com/sharepoint/v3" xsi:nil="true"/>
+    <PublishingStartDate xmlns="http://schemas.microsoft.com/sharepoint/v3" xsi:nil="true"/>
+  </documentManagement>
+</p:properties>
 </file>
 
-<file path=customXml/itemProps2.xml><?xml version="1.0" encoding="utf-8"?>
+<file path=customXml/itemProps1.xml><?xml version="1.0" encoding="utf-8"?>
 <ds:datastoreItem xmlns:ds="http://schemas.openxmlformats.org/officeDocument/2006/customXml" ds:itemID="{98DACE87-CD74-4C35-ADF8-12B4276F2F66}">
   <ds:schemaRefs>
     <ds:schemaRef ds:uri="http://schemas.microsoft.com/sharepoint/v3/contenttype/forms"/>
@@ -8716,7 +9976,7 @@
 </ds:datastoreItem>
 </file>
 
-<file path=customXml/itemProps3.xml><?xml version="1.0" encoding="utf-8"?>
+<file path=customXml/itemProps2.xml><?xml version="1.0" encoding="utf-8"?>
 <ds:datastoreItem xmlns:ds="http://schemas.openxmlformats.org/officeDocument/2006/customXml" ds:itemID="{AB30B8D0-9C02-4061-951A-8B7B3A86F5B0}">
   <ds:schemaRefs>
     <ds:schemaRef ds:uri="http://schemas.microsoft.com/office/2006/metadata/contentType"/>
@@ -8734,4 +9994,14 @@
     <ds:schemaRef ds:uri="http://schemas.microsoft.com/internal/obd"/>
   </ds:schemaRefs>
 </ds:datastoreItem>
+</file>
+
+<file path=customXml/itemProps3.xml><?xml version="1.0" encoding="utf-8"?>
+<ds:datastoreItem xmlns:ds="http://schemas.openxmlformats.org/officeDocument/2006/customXml" ds:itemID="{BEF3FD83-2601-46A9-AA9B-655B326F1C5E}">
+  <ds:schemaRefs>
+    <ds:schemaRef ds:uri="http://schemas.microsoft.com/office/2006/metadata/properties"/>
+    <ds:schemaRef ds:uri="http://schemas.microsoft.com/office/infopath/2007/PartnerControls"/>
+    <ds:schemaRef ds:uri="http://schemas.microsoft.com/sharepoint/v3"/>
+  </ds:schemaRefs>
+</ds:datastoreItem>
 </file>
</xml_diff>